<commit_message>
Ready for Orlando Code Camp 2023
Final updates
</commit_message>
<xml_diff>
--- a/2023-03-Orlando/2023-03 SQL Server Security Orlando Version.pptx
+++ b/2023-03-Orlando/2023-03 SQL Server Security Orlando Version.pptx
@@ -5,21 +5,23 @@
     <p:sldMasterId id="2147483684" r:id="rId4"/>
   </p:sldMasterIdLst>
   <p:notesMasterIdLst>
-    <p:notesMasterId r:id="rId14"/>
+    <p:notesMasterId r:id="rId16"/>
   </p:notesMasterIdLst>
   <p:handoutMasterIdLst>
-    <p:handoutMasterId r:id="rId15"/>
+    <p:handoutMasterId r:id="rId17"/>
   </p:handoutMasterIdLst>
   <p:sldIdLst>
     <p:sldId id="257" r:id="rId5"/>
-    <p:sldId id="270" r:id="rId6"/>
-    <p:sldId id="397" r:id="rId7"/>
-    <p:sldId id="398" r:id="rId8"/>
-    <p:sldId id="399" r:id="rId9"/>
-    <p:sldId id="396" r:id="rId10"/>
-    <p:sldId id="401" r:id="rId11"/>
-    <p:sldId id="400" r:id="rId12"/>
-    <p:sldId id="395" r:id="rId13"/>
+    <p:sldId id="398" r:id="rId6"/>
+    <p:sldId id="270" r:id="rId7"/>
+    <p:sldId id="397" r:id="rId8"/>
+    <p:sldId id="402" r:id="rId9"/>
+    <p:sldId id="399" r:id="rId10"/>
+    <p:sldId id="396" r:id="rId11"/>
+    <p:sldId id="401" r:id="rId12"/>
+    <p:sldId id="400" r:id="rId13"/>
+    <p:sldId id="403" r:id="rId14"/>
+    <p:sldId id="395" r:id="rId15"/>
   </p:sldIdLst>
   <p:sldSz cx="12192000" cy="6858000"/>
   <p:notesSz cx="6858000" cy="9144000"/>
@@ -770,6 +772,90 @@
 </p:notes>
 </file>
 
+<file path=ppt/notesSlides/notesSlide10.xml><?xml version="1.0" encoding="utf-8"?>
+<p:notes xmlns:a="http://schemas.openxmlformats.org/drawingml/2006/main" xmlns:r="http://schemas.openxmlformats.org/officeDocument/2006/relationships" xmlns:p="http://schemas.openxmlformats.org/presentationml/2006/main">
+  <p:cSld>
+    <p:spTree>
+      <p:nvGrpSpPr>
+        <p:cNvPr id="1" name=""/>
+        <p:cNvGrpSpPr/>
+        <p:nvPr/>
+      </p:nvGrpSpPr>
+      <p:grpSpPr>
+        <a:xfrm>
+          <a:off x="0" y="0"/>
+          <a:ext cx="0" cy="0"/>
+          <a:chOff x="0" y="0"/>
+          <a:chExt cx="0" cy="0"/>
+        </a:xfrm>
+      </p:grpSpPr>
+      <p:sp>
+        <p:nvSpPr>
+          <p:cNvPr id="2" name="Slide Image Placeholder 1"/>
+          <p:cNvSpPr>
+            <a:spLocks noGrp="1" noRot="1" noChangeAspect="1"/>
+          </p:cNvSpPr>
+          <p:nvPr>
+            <p:ph type="sldImg"/>
+          </p:nvPr>
+        </p:nvSpPr>
+        <p:spPr/>
+      </p:sp>
+      <p:sp>
+        <p:nvSpPr>
+          <p:cNvPr id="3" name="Notes Placeholder 2"/>
+          <p:cNvSpPr>
+            <a:spLocks noGrp="1"/>
+          </p:cNvSpPr>
+          <p:nvPr>
+            <p:ph type="body" idx="1"/>
+          </p:nvPr>
+        </p:nvSpPr>
+        <p:spPr/>
+        <p:txBody>
+          <a:bodyPr/>
+          <a:lstStyle/>
+          <a:p>
+            <a:endParaRPr lang="en-US" dirty="0"/>
+          </a:p>
+        </p:txBody>
+      </p:sp>
+      <p:sp>
+        <p:nvSpPr>
+          <p:cNvPr id="4" name="Slide Number Placeholder 3"/>
+          <p:cNvSpPr>
+            <a:spLocks noGrp="1"/>
+          </p:cNvSpPr>
+          <p:nvPr>
+            <p:ph type="sldNum" sz="quarter" idx="5"/>
+          </p:nvPr>
+        </p:nvSpPr>
+        <p:spPr/>
+        <p:txBody>
+          <a:bodyPr/>
+          <a:lstStyle/>
+          <a:p>
+            <a:fld id="{1983A999-5E0E-42CA-8400-604AE921FF7C}" type="slidenum">
+              <a:rPr lang="en-US" smtClean="0"/>
+              <a:t>10</a:t>
+            </a:fld>
+            <a:endParaRPr lang="en-US"/>
+          </a:p>
+        </p:txBody>
+      </p:sp>
+    </p:spTree>
+    <p:extLst>
+      <p:ext uri="{BB962C8B-B14F-4D97-AF65-F5344CB8AC3E}">
+        <p14:creationId xmlns:p14="http://schemas.microsoft.com/office/powerpoint/2010/main" val="2651129786"/>
+      </p:ext>
+    </p:extLst>
+  </p:cSld>
+  <p:clrMapOvr>
+    <a:masterClrMapping/>
+  </p:clrMapOvr>
+</p:notes>
+</file>
+
 <file path=ppt/notesSlides/notesSlide2.xml><?xml version="1.0" encoding="utf-8"?>
 <p:notes xmlns:a="http://schemas.openxmlformats.org/drawingml/2006/main" xmlns:r="http://schemas.openxmlformats.org/officeDocument/2006/relationships" xmlns:p="http://schemas.openxmlformats.org/presentationml/2006/main">
   <p:cSld>
@@ -844,7 +930,7 @@
     </p:spTree>
     <p:extLst>
       <p:ext uri="{BB962C8B-B14F-4D97-AF65-F5344CB8AC3E}">
-        <p14:creationId xmlns:p14="http://schemas.microsoft.com/office/powerpoint/2010/main" val="404304175"/>
+        <p14:creationId xmlns:p14="http://schemas.microsoft.com/office/powerpoint/2010/main" val="4283189659"/>
       </p:ext>
     </p:extLst>
   </p:cSld>
@@ -928,7 +1014,7 @@
     </p:spTree>
     <p:extLst>
       <p:ext uri="{BB962C8B-B14F-4D97-AF65-F5344CB8AC3E}">
-        <p14:creationId xmlns:p14="http://schemas.microsoft.com/office/powerpoint/2010/main" val="3541728398"/>
+        <p14:creationId xmlns:p14="http://schemas.microsoft.com/office/powerpoint/2010/main" val="404304175"/>
       </p:ext>
     </p:extLst>
   </p:cSld>
@@ -1012,7 +1098,7 @@
     </p:spTree>
     <p:extLst>
       <p:ext uri="{BB962C8B-B14F-4D97-AF65-F5344CB8AC3E}">
-        <p14:creationId xmlns:p14="http://schemas.microsoft.com/office/powerpoint/2010/main" val="4283189659"/>
+        <p14:creationId xmlns:p14="http://schemas.microsoft.com/office/powerpoint/2010/main" val="3541728398"/>
       </p:ext>
     </p:extLst>
   </p:cSld>
@@ -1096,7 +1182,7 @@
     </p:spTree>
     <p:extLst>
       <p:ext uri="{BB962C8B-B14F-4D97-AF65-F5344CB8AC3E}">
-        <p14:creationId xmlns:p14="http://schemas.microsoft.com/office/powerpoint/2010/main" val="2236282736"/>
+        <p14:creationId xmlns:p14="http://schemas.microsoft.com/office/powerpoint/2010/main" val="1256768268"/>
       </p:ext>
     </p:extLst>
   </p:cSld>
@@ -1180,7 +1266,7 @@
     </p:spTree>
     <p:extLst>
       <p:ext uri="{BB962C8B-B14F-4D97-AF65-F5344CB8AC3E}">
-        <p14:creationId xmlns:p14="http://schemas.microsoft.com/office/powerpoint/2010/main" val="1024311298"/>
+        <p14:creationId xmlns:p14="http://schemas.microsoft.com/office/powerpoint/2010/main" val="2236282736"/>
       </p:ext>
     </p:extLst>
   </p:cSld>
@@ -1264,7 +1350,7 @@
     </p:spTree>
     <p:extLst>
       <p:ext uri="{BB962C8B-B14F-4D97-AF65-F5344CB8AC3E}">
-        <p14:creationId xmlns:p14="http://schemas.microsoft.com/office/powerpoint/2010/main" val="2573975792"/>
+        <p14:creationId xmlns:p14="http://schemas.microsoft.com/office/powerpoint/2010/main" val="1024311298"/>
       </p:ext>
     </p:extLst>
   </p:cSld>
@@ -1340,6 +1426,90 @@
             <a:fld id="{1983A999-5E0E-42CA-8400-604AE921FF7C}" type="slidenum">
               <a:rPr lang="en-US" smtClean="0"/>
               <a:t>8</a:t>
+            </a:fld>
+            <a:endParaRPr lang="en-US"/>
+          </a:p>
+        </p:txBody>
+      </p:sp>
+    </p:spTree>
+    <p:extLst>
+      <p:ext uri="{BB962C8B-B14F-4D97-AF65-F5344CB8AC3E}">
+        <p14:creationId xmlns:p14="http://schemas.microsoft.com/office/powerpoint/2010/main" val="2573975792"/>
+      </p:ext>
+    </p:extLst>
+  </p:cSld>
+  <p:clrMapOvr>
+    <a:masterClrMapping/>
+  </p:clrMapOvr>
+</p:notes>
+</file>
+
+<file path=ppt/notesSlides/notesSlide9.xml><?xml version="1.0" encoding="utf-8"?>
+<p:notes xmlns:a="http://schemas.openxmlformats.org/drawingml/2006/main" xmlns:r="http://schemas.openxmlformats.org/officeDocument/2006/relationships" xmlns:p="http://schemas.openxmlformats.org/presentationml/2006/main">
+  <p:cSld>
+    <p:spTree>
+      <p:nvGrpSpPr>
+        <p:cNvPr id="1" name=""/>
+        <p:cNvGrpSpPr/>
+        <p:nvPr/>
+      </p:nvGrpSpPr>
+      <p:grpSpPr>
+        <a:xfrm>
+          <a:off x="0" y="0"/>
+          <a:ext cx="0" cy="0"/>
+          <a:chOff x="0" y="0"/>
+          <a:chExt cx="0" cy="0"/>
+        </a:xfrm>
+      </p:grpSpPr>
+      <p:sp>
+        <p:nvSpPr>
+          <p:cNvPr id="2" name="Slide Image Placeholder 1"/>
+          <p:cNvSpPr>
+            <a:spLocks noGrp="1" noRot="1" noChangeAspect="1"/>
+          </p:cNvSpPr>
+          <p:nvPr>
+            <p:ph type="sldImg"/>
+          </p:nvPr>
+        </p:nvSpPr>
+        <p:spPr/>
+      </p:sp>
+      <p:sp>
+        <p:nvSpPr>
+          <p:cNvPr id="3" name="Notes Placeholder 2"/>
+          <p:cNvSpPr>
+            <a:spLocks noGrp="1"/>
+          </p:cNvSpPr>
+          <p:nvPr>
+            <p:ph type="body" idx="1"/>
+          </p:nvPr>
+        </p:nvSpPr>
+        <p:spPr/>
+        <p:txBody>
+          <a:bodyPr/>
+          <a:lstStyle/>
+          <a:p>
+            <a:endParaRPr lang="en-US" dirty="0"/>
+          </a:p>
+        </p:txBody>
+      </p:sp>
+      <p:sp>
+        <p:nvSpPr>
+          <p:cNvPr id="4" name="Slide Number Placeholder 3"/>
+          <p:cNvSpPr>
+            <a:spLocks noGrp="1"/>
+          </p:cNvSpPr>
+          <p:nvPr>
+            <p:ph type="sldNum" sz="quarter" idx="5"/>
+          </p:nvPr>
+        </p:nvSpPr>
+        <p:spPr/>
+        <p:txBody>
+          <a:bodyPr/>
+          <a:lstStyle/>
+          <a:p>
+            <a:fld id="{1983A999-5E0E-42CA-8400-604AE921FF7C}" type="slidenum">
+              <a:rPr lang="en-US" smtClean="0"/>
+              <a:t>9</a:t>
             </a:fld>
             <a:endParaRPr lang="en-US"/>
           </a:p>
@@ -13541,6 +13711,534 @@
 </p:sld>
 </file>
 
+<file path=ppt/slides/slide10.xml><?xml version="1.0" encoding="utf-8"?>
+<p:sld xmlns:a="http://schemas.openxmlformats.org/drawingml/2006/main" xmlns:r="http://schemas.openxmlformats.org/officeDocument/2006/relationships" xmlns:p="http://schemas.openxmlformats.org/presentationml/2006/main">
+  <p:cSld>
+    <p:spTree>
+      <p:nvGrpSpPr>
+        <p:cNvPr id="1" name=""/>
+        <p:cNvGrpSpPr/>
+        <p:nvPr/>
+      </p:nvGrpSpPr>
+      <p:grpSpPr>
+        <a:xfrm>
+          <a:off x="0" y="0"/>
+          <a:ext cx="0" cy="0"/>
+          <a:chOff x="0" y="0"/>
+          <a:chExt cx="0" cy="0"/>
+        </a:xfrm>
+      </p:grpSpPr>
+      <p:sp>
+        <p:nvSpPr>
+          <p:cNvPr id="11" name="Title 10">
+            <a:extLst>
+              <a:ext uri="{FF2B5EF4-FFF2-40B4-BE49-F238E27FC236}">
+                <a16:creationId xmlns:a16="http://schemas.microsoft.com/office/drawing/2014/main" id="{581E8936-2270-47FE-94A4-398CB123EF90}"/>
+              </a:ext>
+            </a:extLst>
+          </p:cNvPr>
+          <p:cNvSpPr>
+            <a:spLocks noGrp="1"/>
+          </p:cNvSpPr>
+          <p:nvPr>
+            <p:ph type="title"/>
+          </p:nvPr>
+        </p:nvSpPr>
+        <p:spPr>
+          <a:xfrm>
+            <a:off x="550863" y="4508500"/>
+            <a:ext cx="4500562" cy="1562959"/>
+          </a:xfrm>
+        </p:spPr>
+        <p:txBody>
+          <a:bodyPr/>
+          <a:lstStyle/>
+          <a:p>
+            <a:r>
+              <a:rPr lang="en-US" dirty="0"/>
+              <a:t>Resources</a:t>
+            </a:r>
+          </a:p>
+        </p:txBody>
+      </p:sp>
+      <p:pic>
+        <p:nvPicPr>
+          <p:cNvPr id="16" name="Picture Placeholder 15" descr="Data Points Digital background">
+            <a:extLst>
+              <a:ext uri="{FF2B5EF4-FFF2-40B4-BE49-F238E27FC236}">
+                <a16:creationId xmlns:a16="http://schemas.microsoft.com/office/drawing/2014/main" id="{361E9ADB-7377-4CF1-9AE4-AEFBDEBEEEEC}"/>
+              </a:ext>
+            </a:extLst>
+          </p:cNvPr>
+          <p:cNvPicPr>
+            <a:picLocks noGrp="1" noChangeAspect="1"/>
+          </p:cNvPicPr>
+          <p:nvPr>
+            <p:ph type="pic" sz="quarter" idx="13"/>
+          </p:nvPr>
+        </p:nvPicPr>
+        <p:blipFill rotWithShape="1">
+          <a:blip r:embed="rId3" cstate="screen">
+            <a:extLst>
+              <a:ext uri="{28A0092B-C50C-407E-A947-70E740481C1C}">
+                <a14:useLocalDpi xmlns:a14="http://schemas.microsoft.com/office/drawing/2010/main" val="0"/>
+              </a:ext>
+            </a:extLst>
+          </a:blip>
+          <a:srcRect/>
+          <a:stretch/>
+        </p:blipFill>
+        <p:spPr>
+          <a:xfrm>
+            <a:off x="0" y="0"/>
+            <a:ext cx="12192000" cy="3776472"/>
+          </a:xfrm>
+        </p:spPr>
+      </p:pic>
+      <p:sp>
+        <p:nvSpPr>
+          <p:cNvPr id="13" name="Content Placeholder 12">
+            <a:extLst>
+              <a:ext uri="{FF2B5EF4-FFF2-40B4-BE49-F238E27FC236}">
+                <a16:creationId xmlns:a16="http://schemas.microsoft.com/office/drawing/2014/main" id="{C0287FEC-3826-4868-8D93-52429C6156F5}"/>
+              </a:ext>
+            </a:extLst>
+          </p:cNvPr>
+          <p:cNvSpPr>
+            <a:spLocks noGrp="1"/>
+          </p:cNvSpPr>
+          <p:nvPr>
+            <p:ph sz="quarter" idx="15"/>
+          </p:nvPr>
+        </p:nvSpPr>
+        <p:spPr>
+          <a:xfrm>
+            <a:off x="3520036" y="4508500"/>
+            <a:ext cx="8129194" cy="1563688"/>
+          </a:xfrm>
+        </p:spPr>
+        <p:txBody>
+          <a:bodyPr>
+            <a:normAutofit/>
+          </a:bodyPr>
+          <a:lstStyle/>
+          <a:p>
+            <a:r>
+              <a:rPr lang="en-US" sz="3200" dirty="0"/>
+              <a:t>https://github.com/joekunk/sql-server-security</a:t>
+            </a:r>
+          </a:p>
+          <a:p>
+            <a:r>
+              <a:rPr lang="en-US" dirty="0"/>
+              <a:t>Public repo with the materials and scripts from this presentation</a:t>
+            </a:r>
+          </a:p>
+        </p:txBody>
+      </p:sp>
+      <p:sp>
+        <p:nvSpPr>
+          <p:cNvPr id="4" name="Date Placeholder 3">
+            <a:extLst>
+              <a:ext uri="{FF2B5EF4-FFF2-40B4-BE49-F238E27FC236}">
+                <a16:creationId xmlns:a16="http://schemas.microsoft.com/office/drawing/2014/main" id="{0C329F70-04F7-4C70-BCF8-D4371F54EF2F}"/>
+              </a:ext>
+            </a:extLst>
+          </p:cNvPr>
+          <p:cNvSpPr>
+            <a:spLocks noGrp="1"/>
+          </p:cNvSpPr>
+          <p:nvPr>
+            <p:ph type="dt" sz="half" idx="10"/>
+          </p:nvPr>
+        </p:nvSpPr>
+        <p:spPr>
+          <a:xfrm>
+            <a:off x="550863" y="6507212"/>
+            <a:ext cx="2628900" cy="153888"/>
+          </a:xfrm>
+        </p:spPr>
+        <p:txBody>
+          <a:bodyPr/>
+          <a:lstStyle/>
+          <a:p>
+            <a:r>
+              <a:rPr lang="en-US" sz="1400" dirty="0"/>
+              <a:t>Saturday March 25, 2023</a:t>
+            </a:r>
+          </a:p>
+        </p:txBody>
+      </p:sp>
+      <p:sp>
+        <p:nvSpPr>
+          <p:cNvPr id="5" name="Footer Placeholder 4">
+            <a:extLst>
+              <a:ext uri="{FF2B5EF4-FFF2-40B4-BE49-F238E27FC236}">
+                <a16:creationId xmlns:a16="http://schemas.microsoft.com/office/drawing/2014/main" id="{06A3302E-502D-4151-81C9-5FD6AF9596D6}"/>
+              </a:ext>
+            </a:extLst>
+          </p:cNvPr>
+          <p:cNvSpPr>
+            <a:spLocks noGrp="1"/>
+          </p:cNvSpPr>
+          <p:nvPr>
+            <p:ph type="ftr" sz="quarter" idx="11"/>
+          </p:nvPr>
+        </p:nvSpPr>
+        <p:spPr>
+          <a:xfrm>
+            <a:off x="3359150" y="6507212"/>
+            <a:ext cx="6379210" cy="153888"/>
+          </a:xfrm>
+        </p:spPr>
+        <p:txBody>
+          <a:bodyPr/>
+          <a:lstStyle/>
+          <a:p>
+            <a:r>
+              <a:rPr lang="en-US" sz="1400" dirty="0"/>
+              <a:t>Orlando Code Camp</a:t>
+            </a:r>
+          </a:p>
+        </p:txBody>
+      </p:sp>
+      <p:sp>
+        <p:nvSpPr>
+          <p:cNvPr id="6" name="Slide Number Placeholder 5">
+            <a:extLst>
+              <a:ext uri="{FF2B5EF4-FFF2-40B4-BE49-F238E27FC236}">
+                <a16:creationId xmlns:a16="http://schemas.microsoft.com/office/drawing/2014/main" id="{9ED907F8-C614-4D59-A03F-BF9CD5E35703}"/>
+              </a:ext>
+            </a:extLst>
+          </p:cNvPr>
+          <p:cNvSpPr>
+            <a:spLocks noGrp="1"/>
+          </p:cNvSpPr>
+          <p:nvPr>
+            <p:ph type="sldNum" sz="quarter" idx="12"/>
+          </p:nvPr>
+        </p:nvSpPr>
+        <p:spPr>
+          <a:xfrm>
+            <a:off x="9948863" y="6507212"/>
+            <a:ext cx="1692274" cy="153888"/>
+          </a:xfrm>
+        </p:spPr>
+        <p:txBody>
+          <a:bodyPr/>
+          <a:lstStyle/>
+          <a:p>
+            <a:fld id="{DBA1B0FB-D917-4C8C-928F-313BD683BF39}" type="slidenum">
+              <a:rPr lang="en-US" sz="1400" smtClean="0"/>
+              <a:pPr/>
+              <a:t>10</a:t>
+            </a:fld>
+            <a:endParaRPr lang="en-US" sz="1400"/>
+          </a:p>
+        </p:txBody>
+      </p:sp>
+    </p:spTree>
+    <p:extLst>
+      <p:ext uri="{BB962C8B-B14F-4D97-AF65-F5344CB8AC3E}">
+        <p14:creationId xmlns:p14="http://schemas.microsoft.com/office/powerpoint/2010/main" val="1612923039"/>
+      </p:ext>
+    </p:extLst>
+  </p:cSld>
+  <p:clrMapOvr>
+    <a:masterClrMapping/>
+  </p:clrMapOvr>
+</p:sld>
+</file>
+
+<file path=ppt/slides/slide11.xml><?xml version="1.0" encoding="utf-8"?>
+<p:sld xmlns:a="http://schemas.openxmlformats.org/drawingml/2006/main" xmlns:r="http://schemas.openxmlformats.org/officeDocument/2006/relationships" xmlns:p="http://schemas.openxmlformats.org/presentationml/2006/main">
+  <p:cSld>
+    <p:spTree>
+      <p:nvGrpSpPr>
+        <p:cNvPr id="1" name=""/>
+        <p:cNvGrpSpPr/>
+        <p:nvPr/>
+      </p:nvGrpSpPr>
+      <p:grpSpPr>
+        <a:xfrm>
+          <a:off x="0" y="0"/>
+          <a:ext cx="0" cy="0"/>
+          <a:chOff x="0" y="0"/>
+          <a:chExt cx="0" cy="0"/>
+        </a:xfrm>
+      </p:grpSpPr>
+      <p:sp>
+        <p:nvSpPr>
+          <p:cNvPr id="22" name="Title 21">
+            <a:extLst>
+              <a:ext uri="{FF2B5EF4-FFF2-40B4-BE49-F238E27FC236}">
+                <a16:creationId xmlns:a16="http://schemas.microsoft.com/office/drawing/2014/main" id="{F8FAEED9-1ECD-45F9-87A0-9394BAEABB79}"/>
+              </a:ext>
+            </a:extLst>
+          </p:cNvPr>
+          <p:cNvSpPr>
+            <a:spLocks noGrp="1"/>
+          </p:cNvSpPr>
+          <p:nvPr>
+            <p:ph type="ctrTitle"/>
+          </p:nvPr>
+        </p:nvSpPr>
+        <p:spPr>
+          <a:xfrm>
+            <a:off x="550863" y="549275"/>
+            <a:ext cx="5437187" cy="1400906"/>
+          </a:xfrm>
+        </p:spPr>
+        <p:txBody>
+          <a:bodyPr/>
+          <a:lstStyle/>
+          <a:p>
+            <a:r>
+              <a:rPr lang="en-US" dirty="0"/>
+              <a:t>Thank You</a:t>
+            </a:r>
+          </a:p>
+        </p:txBody>
+      </p:sp>
+      <p:sp>
+        <p:nvSpPr>
+          <p:cNvPr id="23" name="Subtitle 22">
+            <a:extLst>
+              <a:ext uri="{FF2B5EF4-FFF2-40B4-BE49-F238E27FC236}">
+                <a16:creationId xmlns:a16="http://schemas.microsoft.com/office/drawing/2014/main" id="{8E5E4638-9BCB-4C2E-914F-CC868E2020D5}"/>
+              </a:ext>
+            </a:extLst>
+          </p:cNvPr>
+          <p:cNvSpPr>
+            <a:spLocks noGrp="1"/>
+          </p:cNvSpPr>
+          <p:nvPr>
+            <p:ph type="subTitle" idx="1"/>
+          </p:nvPr>
+        </p:nvSpPr>
+        <p:spPr>
+          <a:xfrm>
+            <a:off x="550863" y="2419821"/>
+            <a:ext cx="5437187" cy="3179868"/>
+          </a:xfrm>
+        </p:spPr>
+        <p:txBody>
+          <a:bodyPr/>
+          <a:lstStyle/>
+          <a:p>
+            <a:r>
+              <a:rPr lang="en-US" dirty="0"/>
+              <a:t>Joe Kunk</a:t>
+            </a:r>
+          </a:p>
+          <a:p>
+            <a:r>
+              <a:rPr lang="en-US" dirty="0"/>
+              <a:t>jkunk@dewpoint.com</a:t>
+            </a:r>
+          </a:p>
+          <a:p>
+            <a:r>
+              <a:rPr lang="en-US" dirty="0"/>
+              <a:t>517-939-9970 mobile</a:t>
+            </a:r>
+          </a:p>
+          <a:p>
+            <a:r>
+              <a:rPr lang="en-US" dirty="0"/>
+              <a:t>LinkedIn:  joe-kunk-b926091</a:t>
+            </a:r>
+          </a:p>
+          <a:p>
+            <a:r>
+              <a:rPr lang="en-US" dirty="0"/>
+              <a:t>Mastodon: @joekunk@techhub.social</a:t>
+            </a:r>
+          </a:p>
+        </p:txBody>
+      </p:sp>
+      <p:pic>
+        <p:nvPicPr>
+          <p:cNvPr id="27" name="Picture Placeholder 26" descr="Data Points Digital background">
+            <a:extLst>
+              <a:ext uri="{FF2B5EF4-FFF2-40B4-BE49-F238E27FC236}">
+                <a16:creationId xmlns:a16="http://schemas.microsoft.com/office/drawing/2014/main" id="{9E660784-34E2-4CDA-926A-DDD6AAF35046}"/>
+              </a:ext>
+            </a:extLst>
+          </p:cNvPr>
+          <p:cNvPicPr>
+            <a:picLocks noGrp="1" noChangeAspect="1"/>
+          </p:cNvPicPr>
+          <p:nvPr>
+            <p:ph type="pic" sz="quarter" idx="15"/>
+          </p:nvPr>
+        </p:nvPicPr>
+        <p:blipFill rotWithShape="1">
+          <a:blip r:embed="rId2" cstate="screen">
+            <a:extLst>
+              <a:ext uri="{28A0092B-C50C-407E-A947-70E740481C1C}">
+                <a14:useLocalDpi xmlns:a14="http://schemas.microsoft.com/office/drawing/2010/main" val="0"/>
+              </a:ext>
+            </a:extLst>
+          </a:blip>
+          <a:srcRect/>
+          <a:stretch/>
+        </p:blipFill>
+        <p:spPr>
+          <a:xfrm>
+            <a:off x="6556248" y="548640"/>
+            <a:ext cx="5084064" cy="2880360"/>
+          </a:xfrm>
+        </p:spPr>
+      </p:pic>
+      <p:pic>
+        <p:nvPicPr>
+          <p:cNvPr id="33" name="Picture Placeholder 32" descr="Data Points Digital background">
+            <a:extLst>
+              <a:ext uri="{FF2B5EF4-FFF2-40B4-BE49-F238E27FC236}">
+                <a16:creationId xmlns:a16="http://schemas.microsoft.com/office/drawing/2014/main" id="{48106962-23C6-4DFE-BB3A-E5FFF03F38CE}"/>
+              </a:ext>
+            </a:extLst>
+          </p:cNvPr>
+          <p:cNvPicPr>
+            <a:picLocks noGrp="1" noChangeAspect="1"/>
+          </p:cNvPicPr>
+          <p:nvPr>
+            <p:ph type="pic" sz="quarter" idx="16"/>
+          </p:nvPr>
+        </p:nvPicPr>
+        <p:blipFill rotWithShape="1">
+          <a:blip r:embed="rId3" cstate="screen">
+            <a:extLst>
+              <a:ext uri="{28A0092B-C50C-407E-A947-70E740481C1C}">
+                <a14:useLocalDpi xmlns:a14="http://schemas.microsoft.com/office/drawing/2010/main" val="0"/>
+              </a:ext>
+            </a:extLst>
+          </a:blip>
+          <a:srcRect/>
+          <a:stretch/>
+        </p:blipFill>
+        <p:spPr>
+          <a:xfrm>
+            <a:off x="6556248" y="3429000"/>
+            <a:ext cx="5084064" cy="2880360"/>
+          </a:xfrm>
+        </p:spPr>
+      </p:pic>
+      <p:sp>
+        <p:nvSpPr>
+          <p:cNvPr id="4" name="Date Placeholder 3">
+            <a:extLst>
+              <a:ext uri="{FF2B5EF4-FFF2-40B4-BE49-F238E27FC236}">
+                <a16:creationId xmlns:a16="http://schemas.microsoft.com/office/drawing/2014/main" id="{7823E305-6365-4345-8BD1-4A31C61D96CB}"/>
+              </a:ext>
+            </a:extLst>
+          </p:cNvPr>
+          <p:cNvSpPr>
+            <a:spLocks noGrp="1"/>
+          </p:cNvSpPr>
+          <p:nvPr>
+            <p:ph type="dt" sz="half" idx="10"/>
+          </p:nvPr>
+        </p:nvSpPr>
+        <p:spPr>
+          <a:xfrm>
+            <a:off x="550863" y="6507212"/>
+            <a:ext cx="2628900" cy="153888"/>
+          </a:xfrm>
+        </p:spPr>
+        <p:txBody>
+          <a:bodyPr/>
+          <a:lstStyle/>
+          <a:p>
+            <a:r>
+              <a:rPr lang="en-US" sz="1400" dirty="0"/>
+              <a:t>Saturday March 25, 2023</a:t>
+            </a:r>
+          </a:p>
+        </p:txBody>
+      </p:sp>
+      <p:sp>
+        <p:nvSpPr>
+          <p:cNvPr id="5" name="Footer Placeholder 4">
+            <a:extLst>
+              <a:ext uri="{FF2B5EF4-FFF2-40B4-BE49-F238E27FC236}">
+                <a16:creationId xmlns:a16="http://schemas.microsoft.com/office/drawing/2014/main" id="{0B37A3FF-ED32-4C4A-A21F-848A3BF6F896}"/>
+              </a:ext>
+            </a:extLst>
+          </p:cNvPr>
+          <p:cNvSpPr>
+            <a:spLocks noGrp="1"/>
+          </p:cNvSpPr>
+          <p:nvPr>
+            <p:ph type="ftr" sz="quarter" idx="11"/>
+          </p:nvPr>
+        </p:nvSpPr>
+        <p:spPr>
+          <a:xfrm>
+            <a:off x="3359150" y="6507212"/>
+            <a:ext cx="6379210" cy="153888"/>
+          </a:xfrm>
+        </p:spPr>
+        <p:txBody>
+          <a:bodyPr/>
+          <a:lstStyle/>
+          <a:p>
+            <a:r>
+              <a:rPr lang="en-US" sz="1400" dirty="0"/>
+              <a:t>Orlando Code Camp</a:t>
+            </a:r>
+          </a:p>
+        </p:txBody>
+      </p:sp>
+      <p:sp>
+        <p:nvSpPr>
+          <p:cNvPr id="6" name="Slide Number Placeholder 5">
+            <a:extLst>
+              <a:ext uri="{FF2B5EF4-FFF2-40B4-BE49-F238E27FC236}">
+                <a16:creationId xmlns:a16="http://schemas.microsoft.com/office/drawing/2014/main" id="{36E60F23-FB58-4EF8-82FD-E86CED25FDD4}"/>
+              </a:ext>
+            </a:extLst>
+          </p:cNvPr>
+          <p:cNvSpPr>
+            <a:spLocks noGrp="1"/>
+          </p:cNvSpPr>
+          <p:nvPr>
+            <p:ph type="sldNum" sz="quarter" idx="12"/>
+          </p:nvPr>
+        </p:nvSpPr>
+        <p:spPr>
+          <a:xfrm>
+            <a:off x="9948863" y="6507212"/>
+            <a:ext cx="1692274" cy="153888"/>
+          </a:xfrm>
+        </p:spPr>
+        <p:txBody>
+          <a:bodyPr/>
+          <a:lstStyle/>
+          <a:p>
+            <a:fld id="{DBA1B0FB-D917-4C8C-928F-313BD683BF39}" type="slidenum">
+              <a:rPr lang="en-US" sz="1400" smtClean="0"/>
+              <a:pPr/>
+              <a:t>11</a:t>
+            </a:fld>
+            <a:endParaRPr lang="en-US" sz="1400"/>
+          </a:p>
+        </p:txBody>
+      </p:sp>
+    </p:spTree>
+    <p:extLst>
+      <p:ext uri="{BB962C8B-B14F-4D97-AF65-F5344CB8AC3E}">
+        <p14:creationId xmlns:p14="http://schemas.microsoft.com/office/powerpoint/2010/main" val="285719596"/>
+      </p:ext>
+    </p:extLst>
+  </p:cSld>
+  <p:clrMapOvr>
+    <a:masterClrMapping/>
+  </p:clrMapOvr>
+</p:sld>
+</file>
+
 <file path=ppt/slides/slide2.xml><?xml version="1.0" encoding="utf-8"?>
 <p:sld xmlns:a="http://schemas.openxmlformats.org/drawingml/2006/main" xmlns:r="http://schemas.openxmlformats.org/officeDocument/2006/relationships" xmlns:p="http://schemas.openxmlformats.org/presentationml/2006/main">
   <p:cSld>
@@ -13916,7 +14614,7 @@
           <a:p>
             <a:r>
               <a:rPr lang="en-US" dirty="0"/>
-              <a:t>What problems have I seen?</a:t>
+              <a:t>The typical basic security steps</a:t>
             </a:r>
           </a:p>
         </p:txBody>
@@ -13948,14 +14646,11 @@
           <a:lstStyle/>
           <a:p>
             <a:pPr rtl="0" fontAlgn="ctr">
-              <a:lnSpc>
-                <a:spcPct val="100000"/>
-              </a:lnSpc>
               <a:spcBef>
                 <a:spcPts val="0"/>
               </a:spcBef>
               <a:spcAft>
-                <a:spcPts val="1200"/>
+                <a:spcPts val="0"/>
               </a:spcAft>
               <a:buFont typeface="Arial" panose="020B0604020202020204" pitchFamily="34" charset="0"/>
               <a:buChar char="•"/>
@@ -13965,218 +14660,34 @@
                 <a:effectLst/>
                 <a:latin typeface="Calibri" panose="020F0502020204030204" pitchFamily="34" charset="0"/>
               </a:rPr>
-              <a:t>Internal staff granted </a:t>
+              <a:t>Create a new sysadmin user, deactivate th</a:t>
+            </a:r>
+            <a:r>
+              <a:rPr lang="en-US" dirty="0">
+                <a:latin typeface="Calibri" panose="020F0502020204030204" pitchFamily="34" charset="0"/>
+              </a:rPr>
+              <a:t>e default </a:t>
             </a:r>
             <a:r>
               <a:rPr lang="en-US" dirty="0" err="1">
-                <a:effectLst/>
                 <a:latin typeface="Calibri" panose="020F0502020204030204" pitchFamily="34" charset="0"/>
               </a:rPr>
               <a:t>sa</a:t>
             </a:r>
             <a:r>
               <a:rPr lang="en-US" dirty="0">
-                <a:effectLst/>
                 <a:latin typeface="Calibri" panose="020F0502020204030204" pitchFamily="34" charset="0"/>
               </a:rPr>
-              <a:t> because they need access to more than 1 database</a:t>
+              <a:t> user</a:t>
             </a:r>
           </a:p>
           <a:p>
             <a:pPr rtl="0" fontAlgn="ctr">
-              <a:lnSpc>
-                <a:spcPct val="100000"/>
-              </a:lnSpc>
               <a:spcBef>
                 <a:spcPts val="0"/>
               </a:spcBef>
               <a:spcAft>
-                <a:spcPts val="1200"/>
-              </a:spcAft>
-              <a:buFont typeface="Arial" panose="020B0604020202020204" pitchFamily="34" charset="0"/>
-              <a:buChar char="•"/>
-            </a:pPr>
-            <a:r>
-              <a:rPr lang="en-US" dirty="0">
-                <a:effectLst/>
-                <a:latin typeface="Calibri" panose="020F0502020204030204" pitchFamily="34" charset="0"/>
-              </a:rPr>
-              <a:t>Vendor connections granted </a:t>
-            </a:r>
-            <a:r>
-              <a:rPr lang="en-US" dirty="0" err="1">
-                <a:effectLst/>
-                <a:latin typeface="Calibri" panose="020F0502020204030204" pitchFamily="34" charset="0"/>
-              </a:rPr>
-              <a:t>dbo</a:t>
-            </a:r>
-            <a:r>
-              <a:rPr lang="en-US" dirty="0">
-                <a:effectLst/>
-                <a:latin typeface="Calibri" panose="020F0502020204030204" pitchFamily="34" charset="0"/>
-              </a:rPr>
-              <a:t> because they need to create a view</a:t>
-            </a:r>
-          </a:p>
-          <a:p>
-            <a:pPr rtl="0" fontAlgn="ctr">
-              <a:lnSpc>
-                <a:spcPct val="100000"/>
-              </a:lnSpc>
-              <a:spcBef>
                 <a:spcPts val="0"/>
-              </a:spcBef>
-              <a:spcAft>
-                <a:spcPts val="1200"/>
-              </a:spcAft>
-              <a:buFont typeface="Arial" panose="020B0604020202020204" pitchFamily="34" charset="0"/>
-              <a:buChar char="•"/>
-            </a:pPr>
-            <a:r>
-              <a:rPr lang="en-US" dirty="0">
-                <a:effectLst/>
-                <a:latin typeface="Calibri" panose="020F0502020204030204" pitchFamily="34" charset="0"/>
-              </a:rPr>
-              <a:t>User added to the role </a:t>
-            </a:r>
-            <a:r>
-              <a:rPr lang="en-US" dirty="0" err="1">
-                <a:effectLst/>
-                <a:latin typeface="Calibri" panose="020F0502020204030204" pitchFamily="34" charset="0"/>
-              </a:rPr>
-              <a:t>db_datareader</a:t>
-            </a:r>
-            <a:r>
-              <a:rPr lang="en-US" dirty="0">
-                <a:effectLst/>
-                <a:latin typeface="Calibri" panose="020F0502020204030204" pitchFamily="34" charset="0"/>
-              </a:rPr>
-              <a:t> since they need to query &gt; 1 table</a:t>
-            </a:r>
-          </a:p>
-          <a:p>
-            <a:pPr rtl="0" fontAlgn="ctr">
-              <a:lnSpc>
-                <a:spcPct val="100000"/>
-              </a:lnSpc>
-              <a:spcBef>
-                <a:spcPts val="0"/>
-              </a:spcBef>
-              <a:spcAft>
-                <a:spcPts val="1200"/>
-              </a:spcAft>
-              <a:buFont typeface="Arial" panose="020B0604020202020204" pitchFamily="34" charset="0"/>
-              <a:buChar char="•"/>
-            </a:pPr>
-            <a:r>
-              <a:rPr lang="en-US" dirty="0">
-                <a:effectLst/>
-                <a:latin typeface="Calibri" panose="020F0502020204030204" pitchFamily="34" charset="0"/>
-              </a:rPr>
-              <a:t>Logins remain for users that have left the company, or for apps no longer used. </a:t>
-            </a:r>
-            <a:br>
-              <a:rPr lang="en-US" dirty="0">
-                <a:effectLst/>
-                <a:latin typeface="Calibri" panose="020F0502020204030204" pitchFamily="34" charset="0"/>
-              </a:rPr>
-            </a:br>
-            <a:r>
-              <a:rPr lang="en-US" dirty="0">
-                <a:effectLst/>
-                <a:latin typeface="Calibri" panose="020F0502020204030204" pitchFamily="34" charset="0"/>
-              </a:rPr>
-              <a:t>Very difficult for another DBA to assist or assume duties due to lack of scripts.</a:t>
-            </a:r>
-          </a:p>
-          <a:p>
-            <a:pPr rtl="0" fontAlgn="ctr">
-              <a:lnSpc>
-                <a:spcPct val="100000"/>
-              </a:lnSpc>
-              <a:spcBef>
-                <a:spcPts val="0"/>
-              </a:spcBef>
-              <a:spcAft>
-                <a:spcPts val="1200"/>
-              </a:spcAft>
-              <a:buFont typeface="Arial" panose="020B0604020202020204" pitchFamily="34" charset="0"/>
-              <a:buChar char="•"/>
-            </a:pPr>
-            <a:r>
-              <a:rPr lang="en-US" dirty="0">
-                <a:effectLst/>
-                <a:latin typeface="Calibri" panose="020F0502020204030204" pitchFamily="34" charset="0"/>
-              </a:rPr>
-              <a:t>Permissions assigned directly to named users, difficult to change or add staff</a:t>
-            </a:r>
-          </a:p>
-          <a:p>
-            <a:pPr rtl="0" fontAlgn="ctr">
-              <a:lnSpc>
-                <a:spcPct val="100000"/>
-              </a:lnSpc>
-              <a:spcBef>
-                <a:spcPts val="0"/>
-              </a:spcBef>
-              <a:spcAft>
-                <a:spcPts val="1200"/>
-              </a:spcAft>
-              <a:buFont typeface="Arial" panose="020B0604020202020204" pitchFamily="34" charset="0"/>
-              <a:buChar char="•"/>
-            </a:pPr>
-            <a:r>
-              <a:rPr lang="en-US" dirty="0">
-                <a:effectLst/>
-                <a:latin typeface="Calibri" panose="020F0502020204030204" pitchFamily="34" charset="0"/>
-              </a:rPr>
-              <a:t>Granting permissions to </a:t>
-            </a:r>
-            <a:r>
-              <a:rPr lang="en-US" dirty="0" err="1">
-                <a:effectLst/>
-                <a:latin typeface="Calibri" panose="020F0502020204030204" pitchFamily="34" charset="0"/>
-              </a:rPr>
-              <a:t>db</a:t>
-            </a:r>
-            <a:r>
-              <a:rPr lang="en-US" dirty="0">
-                <a:effectLst/>
-                <a:latin typeface="Calibri" panose="020F0502020204030204" pitchFamily="34" charset="0"/>
-              </a:rPr>
-              <a:t> role ‘public’, giving that permission to anyone that can connect to the server with a login</a:t>
-            </a:r>
-          </a:p>
-          <a:p>
-            <a:pPr fontAlgn="ctr">
-              <a:lnSpc>
-                <a:spcPct val="100000"/>
-              </a:lnSpc>
-              <a:spcBef>
-                <a:spcPts val="0"/>
-              </a:spcBef>
-              <a:spcAft>
-                <a:spcPts val="1200"/>
-              </a:spcAft>
-            </a:pPr>
-            <a:r>
-              <a:rPr lang="en-US" dirty="0">
-                <a:effectLst/>
-                <a:latin typeface="Calibri" panose="020F0502020204030204" pitchFamily="34" charset="0"/>
-              </a:rPr>
-              <a:t>No regular review of permissions assigned</a:t>
-            </a:r>
-          </a:p>
-          <a:p>
-            <a:pPr rtl="0" fontAlgn="ctr">
-              <a:lnSpc>
-                <a:spcPct val="100000"/>
-              </a:lnSpc>
-              <a:spcBef>
-                <a:spcPts val="0"/>
-              </a:spcBef>
-              <a:spcAft>
-                <a:spcPts val="1200"/>
               </a:spcAft>
               <a:buFont typeface="Arial" panose="020B0604020202020204" pitchFamily="34" charset="0"/>
               <a:buChar char="•"/>
@@ -14186,6 +14697,157 @@
               <a:latin typeface="Calibri" panose="020F0502020204030204" pitchFamily="34" charset="0"/>
             </a:endParaRPr>
           </a:p>
+          <a:p>
+            <a:pPr rtl="0" fontAlgn="ctr">
+              <a:spcBef>
+                <a:spcPts val="0"/>
+              </a:spcBef>
+              <a:spcAft>
+                <a:spcPts val="0"/>
+              </a:spcAft>
+              <a:buFont typeface="Arial" panose="020B0604020202020204" pitchFamily="34" charset="0"/>
+              <a:buChar char="•"/>
+            </a:pPr>
+            <a:r>
+              <a:rPr lang="en-US" dirty="0">
+                <a:latin typeface="Calibri" panose="020F0502020204030204" pitchFamily="34" charset="0"/>
+              </a:rPr>
+              <a:t>Change the default port 1433 to a different port number</a:t>
+            </a:r>
+          </a:p>
+          <a:p>
+            <a:pPr rtl="0" fontAlgn="ctr">
+              <a:spcBef>
+                <a:spcPts val="0"/>
+              </a:spcBef>
+              <a:spcAft>
+                <a:spcPts val="0"/>
+              </a:spcAft>
+              <a:buFont typeface="Arial" panose="020B0604020202020204" pitchFamily="34" charset="0"/>
+              <a:buChar char="•"/>
+            </a:pPr>
+            <a:endParaRPr lang="en-US" dirty="0">
+              <a:effectLst/>
+              <a:latin typeface="Calibri" panose="020F0502020204030204" pitchFamily="34" charset="0"/>
+            </a:endParaRPr>
+          </a:p>
+          <a:p>
+            <a:pPr rtl="0" fontAlgn="ctr">
+              <a:spcBef>
+                <a:spcPts val="0"/>
+              </a:spcBef>
+              <a:spcAft>
+                <a:spcPts val="0"/>
+              </a:spcAft>
+              <a:buFont typeface="Arial" panose="020B0604020202020204" pitchFamily="34" charset="0"/>
+              <a:buChar char="•"/>
+            </a:pPr>
+            <a:r>
+              <a:rPr lang="en-US" dirty="0">
+                <a:latin typeface="Calibri" panose="020F0502020204030204" pitchFamily="34" charset="0"/>
+              </a:rPr>
+              <a:t>Use a different managed service account for each SQL Server windows service</a:t>
+            </a:r>
+            <a:br>
+              <a:rPr lang="en-US" dirty="0">
+                <a:latin typeface="Calibri" panose="020F0502020204030204" pitchFamily="34" charset="0"/>
+              </a:rPr>
+            </a:br>
+            <a:endParaRPr lang="en-US" dirty="0">
+              <a:latin typeface="Calibri" panose="020F0502020204030204" pitchFamily="34" charset="0"/>
+            </a:endParaRPr>
+          </a:p>
+          <a:p>
+            <a:pPr rtl="0" fontAlgn="ctr">
+              <a:spcBef>
+                <a:spcPts val="0"/>
+              </a:spcBef>
+              <a:spcAft>
+                <a:spcPts val="0"/>
+              </a:spcAft>
+              <a:buFont typeface="Arial" panose="020B0604020202020204" pitchFamily="34" charset="0"/>
+              <a:buChar char="•"/>
+            </a:pPr>
+            <a:r>
+              <a:rPr lang="en-US" dirty="0">
+                <a:effectLst/>
+                <a:latin typeface="Calibri" panose="020F0502020204030204" pitchFamily="34" charset="0"/>
+              </a:rPr>
+              <a:t>Turn on logging of successful logins as well as failed logins</a:t>
+            </a:r>
+            <a:br>
+              <a:rPr lang="en-US" dirty="0">
+                <a:effectLst/>
+                <a:latin typeface="Calibri" panose="020F0502020204030204" pitchFamily="34" charset="0"/>
+              </a:rPr>
+            </a:br>
+            <a:endParaRPr lang="en-US" dirty="0">
+              <a:effectLst/>
+              <a:latin typeface="Calibri" panose="020F0502020204030204" pitchFamily="34" charset="0"/>
+            </a:endParaRPr>
+          </a:p>
+          <a:p>
+            <a:pPr rtl="0" fontAlgn="ctr">
+              <a:spcBef>
+                <a:spcPts val="0"/>
+              </a:spcBef>
+              <a:spcAft>
+                <a:spcPts val="0"/>
+              </a:spcAft>
+              <a:buFont typeface="Arial" panose="020B0604020202020204" pitchFamily="34" charset="0"/>
+              <a:buChar char="•"/>
+            </a:pPr>
+            <a:r>
+              <a:rPr lang="en-US" dirty="0">
+                <a:effectLst/>
+                <a:latin typeface="Calibri" panose="020F0502020204030204" pitchFamily="34" charset="0"/>
+              </a:rPr>
+              <a:t>Enable T</a:t>
+            </a:r>
+            <a:r>
+              <a:rPr lang="en-US" dirty="0">
+                <a:latin typeface="Calibri" panose="020F0502020204030204" pitchFamily="34" charset="0"/>
+              </a:rPr>
+              <a:t>ransparent Data Encryption (TDE)</a:t>
+            </a:r>
+            <a:br>
+              <a:rPr lang="en-US" dirty="0">
+                <a:latin typeface="Calibri" panose="020F0502020204030204" pitchFamily="34" charset="0"/>
+              </a:rPr>
+            </a:br>
+            <a:endParaRPr lang="en-US" dirty="0">
+              <a:latin typeface="Calibri" panose="020F0502020204030204" pitchFamily="34" charset="0"/>
+            </a:endParaRPr>
+          </a:p>
+          <a:p>
+            <a:pPr rtl="0" fontAlgn="ctr">
+              <a:spcBef>
+                <a:spcPts val="0"/>
+              </a:spcBef>
+              <a:spcAft>
+                <a:spcPts val="0"/>
+              </a:spcAft>
+              <a:buFont typeface="Arial" panose="020B0604020202020204" pitchFamily="34" charset="0"/>
+              <a:buChar char="•"/>
+            </a:pPr>
+            <a:r>
+              <a:rPr lang="en-US" dirty="0">
+                <a:effectLst/>
+                <a:latin typeface="Calibri" panose="020F0502020204030204" pitchFamily="34" charset="0"/>
+              </a:rPr>
+              <a:t>Zero trust Virtual LAN – only </a:t>
+            </a:r>
+            <a:r>
+              <a:rPr lang="en-US" dirty="0">
+                <a:latin typeface="Calibri" panose="020F0502020204030204" pitchFamily="34" charset="0"/>
+              </a:rPr>
+              <a:t>pre-authorized connections allowed</a:t>
+            </a:r>
+            <a:endParaRPr lang="en-US" dirty="0">
+              <a:effectLst/>
+              <a:latin typeface="Calibri" panose="020F0502020204030204" pitchFamily="34" charset="0"/>
+            </a:endParaRPr>
+          </a:p>
         </p:txBody>
       </p:sp>
       <p:sp>
@@ -14285,7 +14947,7 @@
               <a:pPr/>
               <a:t>2</a:t>
             </a:fld>
-            <a:endParaRPr lang="en-US" sz="1400" dirty="0"/>
+            <a:endParaRPr lang="en-US" sz="1400"/>
           </a:p>
         </p:txBody>
       </p:sp>
@@ -14453,7 +15115,7 @@
     </p:spTree>
     <p:extLst>
       <p:ext uri="{BB962C8B-B14F-4D97-AF65-F5344CB8AC3E}">
-        <p14:creationId xmlns:p14="http://schemas.microsoft.com/office/powerpoint/2010/main" val="3891345585"/>
+        <p14:creationId xmlns:p14="http://schemas.microsoft.com/office/powerpoint/2010/main" val="4071109867"/>
       </p:ext>
     </p:extLst>
   </p:cSld>
@@ -14838,7 +15500,7 @@
           <a:p>
             <a:r>
               <a:rPr lang="en-US" dirty="0"/>
-              <a:t>Why does this happen?</a:t>
+              <a:t>What problems have I seen?</a:t>
             </a:r>
           </a:p>
         </p:txBody>
@@ -14870,11 +15532,14 @@
           <a:lstStyle/>
           <a:p>
             <a:pPr rtl="0" fontAlgn="ctr">
+              <a:lnSpc>
+                <a:spcPct val="100000"/>
+              </a:lnSpc>
               <a:spcBef>
                 <a:spcPts val="0"/>
               </a:spcBef>
               <a:spcAft>
-                <a:spcPts val="0"/>
+                <a:spcPts val="1200"/>
               </a:spcAft>
               <a:buFont typeface="Arial" panose="020B0604020202020204" pitchFamily="34" charset="0"/>
               <a:buChar char="•"/>
@@ -14884,7 +15549,115 @@
                 <a:effectLst/>
                 <a:latin typeface="Calibri" panose="020F0502020204030204" pitchFamily="34" charset="0"/>
               </a:rPr>
-              <a:t>DBAs are often overworked, often just one for a large company; they only have time to react to the immediate request.</a:t>
+              <a:t>Internal staff granted </a:t>
+            </a:r>
+            <a:r>
+              <a:rPr lang="en-US" dirty="0" err="1">
+                <a:effectLst/>
+                <a:latin typeface="Calibri" panose="020F0502020204030204" pitchFamily="34" charset="0"/>
+              </a:rPr>
+              <a:t>sa</a:t>
+            </a:r>
+            <a:r>
+              <a:rPr lang="en-US" dirty="0">
+                <a:effectLst/>
+                <a:latin typeface="Calibri" panose="020F0502020204030204" pitchFamily="34" charset="0"/>
+              </a:rPr>
+              <a:t> because they need access to more than 1 database</a:t>
+            </a:r>
+          </a:p>
+          <a:p>
+            <a:pPr rtl="0" fontAlgn="ctr">
+              <a:lnSpc>
+                <a:spcPct val="100000"/>
+              </a:lnSpc>
+              <a:spcBef>
+                <a:spcPts val="0"/>
+              </a:spcBef>
+              <a:spcAft>
+                <a:spcPts val="1200"/>
+              </a:spcAft>
+              <a:buFont typeface="Arial" panose="020B0604020202020204" pitchFamily="34" charset="0"/>
+              <a:buChar char="•"/>
+            </a:pPr>
+            <a:r>
+              <a:rPr lang="en-US" dirty="0">
+                <a:effectLst/>
+                <a:latin typeface="Calibri" panose="020F0502020204030204" pitchFamily="34" charset="0"/>
+              </a:rPr>
+              <a:t>Vendor connections granted </a:t>
+            </a:r>
+            <a:r>
+              <a:rPr lang="en-US" dirty="0" err="1">
+                <a:effectLst/>
+                <a:latin typeface="Calibri" panose="020F0502020204030204" pitchFamily="34" charset="0"/>
+              </a:rPr>
+              <a:t>dbo</a:t>
+            </a:r>
+            <a:r>
+              <a:rPr lang="en-US" dirty="0">
+                <a:effectLst/>
+                <a:latin typeface="Calibri" panose="020F0502020204030204" pitchFamily="34" charset="0"/>
+              </a:rPr>
+              <a:t> because they need to create a view</a:t>
+            </a:r>
+          </a:p>
+          <a:p>
+            <a:pPr rtl="0" fontAlgn="ctr">
+              <a:lnSpc>
+                <a:spcPct val="100000"/>
+              </a:lnSpc>
+              <a:spcBef>
+                <a:spcPts val="0"/>
+              </a:spcBef>
+              <a:spcAft>
+                <a:spcPts val="1200"/>
+              </a:spcAft>
+              <a:buFont typeface="Arial" panose="020B0604020202020204" pitchFamily="34" charset="0"/>
+              <a:buChar char="•"/>
+            </a:pPr>
+            <a:r>
+              <a:rPr lang="en-US" dirty="0">
+                <a:effectLst/>
+                <a:latin typeface="Calibri" panose="020F0502020204030204" pitchFamily="34" charset="0"/>
+              </a:rPr>
+              <a:t>User added to the role </a:t>
+            </a:r>
+            <a:r>
+              <a:rPr lang="en-US" dirty="0" err="1">
+                <a:effectLst/>
+                <a:latin typeface="Calibri" panose="020F0502020204030204" pitchFamily="34" charset="0"/>
+              </a:rPr>
+              <a:t>db_datareader</a:t>
+            </a:r>
+            <a:r>
+              <a:rPr lang="en-US" dirty="0">
+                <a:effectLst/>
+                <a:latin typeface="Calibri" panose="020F0502020204030204" pitchFamily="34" charset="0"/>
+              </a:rPr>
+              <a:t> since they need to query &gt; 1 table</a:t>
+            </a:r>
+          </a:p>
+          <a:p>
+            <a:pPr rtl="0" fontAlgn="ctr">
+              <a:lnSpc>
+                <a:spcPct val="100000"/>
+              </a:lnSpc>
+              <a:spcBef>
+                <a:spcPts val="0"/>
+              </a:spcBef>
+              <a:spcAft>
+                <a:spcPts val="1200"/>
+              </a:spcAft>
+              <a:buFont typeface="Arial" panose="020B0604020202020204" pitchFamily="34" charset="0"/>
+              <a:buChar char="•"/>
+            </a:pPr>
+            <a:r>
+              <a:rPr lang="en-US" dirty="0">
+                <a:effectLst/>
+                <a:latin typeface="Calibri" panose="020F0502020204030204" pitchFamily="34" charset="0"/>
+              </a:rPr>
+              <a:t>Logins remain for users that have left the company, or for apps no longer used. </a:t>
             </a:r>
             <a:br>
               <a:rPr lang="en-US" dirty="0">
@@ -14892,100 +15665,110 @@
                 <a:latin typeface="Calibri" panose="020F0502020204030204" pitchFamily="34" charset="0"/>
               </a:rPr>
             </a:br>
+            <a:r>
+              <a:rPr lang="en-US" dirty="0">
+                <a:effectLst/>
+                <a:latin typeface="Calibri" panose="020F0502020204030204" pitchFamily="34" charset="0"/>
+              </a:rPr>
+              <a:t>Very difficult for another DBA to assist or assume duties due to lack of scripts.</a:t>
+            </a:r>
+          </a:p>
+          <a:p>
+            <a:pPr rtl="0" fontAlgn="ctr">
+              <a:lnSpc>
+                <a:spcPct val="100000"/>
+              </a:lnSpc>
+              <a:spcBef>
+                <a:spcPts val="0"/>
+              </a:spcBef>
+              <a:spcAft>
+                <a:spcPts val="1200"/>
+              </a:spcAft>
+              <a:buFont typeface="Arial" panose="020B0604020202020204" pitchFamily="34" charset="0"/>
+              <a:buChar char="•"/>
+            </a:pPr>
+            <a:r>
+              <a:rPr lang="en-US" dirty="0">
+                <a:effectLst/>
+                <a:latin typeface="Calibri" panose="020F0502020204030204" pitchFamily="34" charset="0"/>
+              </a:rPr>
+              <a:t>Permissions assigned directly to named users, difficult to change or add staff</a:t>
+            </a:r>
+          </a:p>
+          <a:p>
+            <a:pPr rtl="0" fontAlgn="ctr">
+              <a:lnSpc>
+                <a:spcPct val="100000"/>
+              </a:lnSpc>
+              <a:spcBef>
+                <a:spcPts val="0"/>
+              </a:spcBef>
+              <a:spcAft>
+                <a:spcPts val="1200"/>
+              </a:spcAft>
+              <a:buFont typeface="Arial" panose="020B0604020202020204" pitchFamily="34" charset="0"/>
+              <a:buChar char="•"/>
+            </a:pPr>
+            <a:r>
+              <a:rPr lang="en-US" dirty="0">
+                <a:effectLst/>
+                <a:latin typeface="Calibri" panose="020F0502020204030204" pitchFamily="34" charset="0"/>
+              </a:rPr>
+              <a:t>Granting permissions to </a:t>
+            </a:r>
+            <a:r>
+              <a:rPr lang="en-US" dirty="0" err="1">
+                <a:effectLst/>
+                <a:latin typeface="Calibri" panose="020F0502020204030204" pitchFamily="34" charset="0"/>
+              </a:rPr>
+              <a:t>db</a:t>
+            </a:r>
+            <a:r>
+              <a:rPr lang="en-US" dirty="0">
+                <a:effectLst/>
+                <a:latin typeface="Calibri" panose="020F0502020204030204" pitchFamily="34" charset="0"/>
+              </a:rPr>
+              <a:t> role ‘public’, giving that permission to anyone that can connect to the server with a login</a:t>
+            </a:r>
+          </a:p>
+          <a:p>
+            <a:pPr fontAlgn="ctr">
+              <a:lnSpc>
+                <a:spcPct val="100000"/>
+              </a:lnSpc>
+              <a:spcBef>
+                <a:spcPts val="0"/>
+              </a:spcBef>
+              <a:spcAft>
+                <a:spcPts val="1200"/>
+              </a:spcAft>
+            </a:pPr>
+            <a:r>
+              <a:rPr lang="en-US" dirty="0">
+                <a:effectLst/>
+                <a:latin typeface="Calibri" panose="020F0502020204030204" pitchFamily="34" charset="0"/>
+              </a:rPr>
+              <a:t>No regular review of permissions assigned</a:t>
+            </a:r>
+          </a:p>
+          <a:p>
+            <a:pPr rtl="0" fontAlgn="ctr">
+              <a:lnSpc>
+                <a:spcPct val="100000"/>
+              </a:lnSpc>
+              <a:spcBef>
+                <a:spcPts val="0"/>
+              </a:spcBef>
+              <a:spcAft>
+                <a:spcPts val="1200"/>
+              </a:spcAft>
+              <a:buFont typeface="Arial" panose="020B0604020202020204" pitchFamily="34" charset="0"/>
+              <a:buChar char="•"/>
+            </a:pPr>
             <a:endParaRPr lang="en-US" dirty="0">
               <a:effectLst/>
               <a:latin typeface="Calibri" panose="020F0502020204030204" pitchFamily="34" charset="0"/>
             </a:endParaRPr>
-          </a:p>
-          <a:p>
-            <a:pPr rtl="0" fontAlgn="ctr">
-              <a:spcBef>
-                <a:spcPts val="0"/>
-              </a:spcBef>
-              <a:spcAft>
-                <a:spcPts val="0"/>
-              </a:spcAft>
-              <a:buFont typeface="Arial" panose="020B0604020202020204" pitchFamily="34" charset="0"/>
-              <a:buChar char="•"/>
-            </a:pPr>
-            <a:r>
-              <a:rPr lang="en-US" dirty="0">
-                <a:effectLst/>
-                <a:latin typeface="Calibri" panose="020F0502020204030204" pitchFamily="34" charset="0"/>
-              </a:rPr>
-              <a:t>Fine-tuning security usually takes longer, but only slightly if you know how. </a:t>
-            </a:r>
-            <a:br>
-              <a:rPr lang="en-US" dirty="0">
-                <a:effectLst/>
-                <a:latin typeface="Calibri" panose="020F0502020204030204" pitchFamily="34" charset="0"/>
-              </a:rPr>
-            </a:br>
-            <a:r>
-              <a:rPr lang="en-US" dirty="0">
-                <a:effectLst/>
-                <a:latin typeface="Calibri" panose="020F0502020204030204" pitchFamily="34" charset="0"/>
-              </a:rPr>
-              <a:t>Easy to get it wrong.</a:t>
-            </a:r>
-            <a:br>
-              <a:rPr lang="en-US" dirty="0">
-                <a:effectLst/>
-                <a:latin typeface="Calibri" panose="020F0502020204030204" pitchFamily="34" charset="0"/>
-              </a:rPr>
-            </a:br>
-            <a:endParaRPr lang="en-US" dirty="0">
-              <a:effectLst/>
-              <a:latin typeface="Calibri" panose="020F0502020204030204" pitchFamily="34" charset="0"/>
-            </a:endParaRPr>
-          </a:p>
-          <a:p>
-            <a:pPr rtl="0" fontAlgn="ctr">
-              <a:spcBef>
-                <a:spcPts val="0"/>
-              </a:spcBef>
-              <a:spcAft>
-                <a:spcPts val="0"/>
-              </a:spcAft>
-              <a:buFont typeface="Arial" panose="020B0604020202020204" pitchFamily="34" charset="0"/>
-              <a:buChar char="•"/>
-            </a:pPr>
-            <a:r>
-              <a:rPr lang="en-US" dirty="0">
-                <a:effectLst/>
-                <a:latin typeface="Calibri" panose="020F0502020204030204" pitchFamily="34" charset="0"/>
-              </a:rPr>
-              <a:t>Requestors are unsure of what they will need and don't want to create delays from multiple tickets.</a:t>
-            </a:r>
-            <a:br>
-              <a:rPr lang="en-US" dirty="0">
-                <a:effectLst/>
-                <a:latin typeface="Calibri" panose="020F0502020204030204" pitchFamily="34" charset="0"/>
-              </a:rPr>
-            </a:br>
-            <a:endParaRPr lang="en-US" dirty="0">
-              <a:effectLst/>
-              <a:latin typeface="Calibri" panose="020F0502020204030204" pitchFamily="34" charset="0"/>
-            </a:endParaRPr>
-          </a:p>
-          <a:p>
-            <a:pPr rtl="0" fontAlgn="ctr">
-              <a:spcBef>
-                <a:spcPts val="0"/>
-              </a:spcBef>
-              <a:spcAft>
-                <a:spcPts val="0"/>
-              </a:spcAft>
-              <a:buFont typeface="Arial" panose="020B0604020202020204" pitchFamily="34" charset="0"/>
-              <a:buChar char="•"/>
-            </a:pPr>
-            <a:r>
-              <a:rPr lang="en-US" dirty="0">
-                <a:effectLst/>
-                <a:latin typeface="Calibri" panose="020F0502020204030204" pitchFamily="34" charset="0"/>
-              </a:rPr>
-              <a:t>A View can query across multiple databases, but permissions are assigned at the database level.</a:t>
-            </a:r>
           </a:p>
         </p:txBody>
       </p:sp>
@@ -15086,7 +15869,7 @@
               <a:pPr/>
               <a:t>3</a:t>
             </a:fld>
-            <a:endParaRPr lang="en-US" sz="1400"/>
+            <a:endParaRPr lang="en-US" sz="1400" dirty="0"/>
           </a:p>
         </p:txBody>
       </p:sp>
@@ -15254,7 +16037,7 @@
     </p:spTree>
     <p:extLst>
       <p:ext uri="{BB962C8B-B14F-4D97-AF65-F5344CB8AC3E}">
-        <p14:creationId xmlns:p14="http://schemas.microsoft.com/office/powerpoint/2010/main" val="881419837"/>
+        <p14:creationId xmlns:p14="http://schemas.microsoft.com/office/powerpoint/2010/main" val="3891345585"/>
       </p:ext>
     </p:extLst>
   </p:cSld>
@@ -15639,7 +16422,7 @@
           <a:p>
             <a:r>
               <a:rPr lang="en-US" dirty="0"/>
-              <a:t>What should happen?</a:t>
+              <a:t>Why does this happen?</a:t>
             </a:r>
           </a:p>
         </p:txBody>
@@ -15685,7 +16468,7 @@
                 <a:effectLst/>
                 <a:latin typeface="Calibri" panose="020F0502020204030204" pitchFamily="34" charset="0"/>
               </a:rPr>
-              <a:t>Principle of Least Privilege. Permissions should be to the absolute minimum needed to accomplish the task</a:t>
+              <a:t>DBAs are often overworked, often just one for a large company; they only have time to react to the immediate request.</a:t>
             </a:r>
             <a:br>
               <a:rPr lang="en-US" dirty="0">
@@ -15711,9 +16494,23 @@
             </a:pPr>
             <a:r>
               <a:rPr lang="en-US" dirty="0">
+                <a:effectLst/>
                 <a:latin typeface="Calibri" panose="020F0502020204030204" pitchFamily="34" charset="0"/>
               </a:rPr>
-              <a:t>Windows users are preferred over SQL Users</a:t>
+              <a:t>Fine-tuning security usually takes longer, but only slightly if you know how. </a:t>
+            </a:r>
+            <a:br>
+              <a:rPr lang="en-US" dirty="0">
+                <a:effectLst/>
+                <a:latin typeface="Calibri" panose="020F0502020204030204" pitchFamily="34" charset="0"/>
+              </a:rPr>
+            </a:br>
+            <a:r>
+              <a:rPr lang="en-US" dirty="0">
+                <a:effectLst/>
+                <a:latin typeface="Calibri" panose="020F0502020204030204" pitchFamily="34" charset="0"/>
+              </a:rPr>
+              <a:t>Easy to get it wrong.</a:t>
             </a:r>
             <a:br>
               <a:rPr lang="en-US" dirty="0">
@@ -15742,20 +16539,7 @@
                 <a:effectLst/>
                 <a:latin typeface="Calibri" panose="020F0502020204030204" pitchFamily="34" charset="0"/>
               </a:rPr>
-              <a:t>Security should be limited to specific schemas and provided by database roles</a:t>
-            </a:r>
-            <a:br>
-              <a:rPr lang="en-US" dirty="0">
-                <a:effectLst/>
-                <a:latin typeface="Calibri" panose="020F0502020204030204" pitchFamily="34" charset="0"/>
-              </a:rPr>
-            </a:br>
-            <a:r>
-              <a:rPr lang="en-US" dirty="0">
-                <a:effectLst/>
-                <a:latin typeface="Calibri" panose="020F0502020204030204" pitchFamily="34" charset="0"/>
-              </a:rPr>
-              <a:t>That will be explained later in this presentation</a:t>
+              <a:t>Requestors are unsure of what they will need and don't want to create delays from multiple tickets.</a:t>
             </a:r>
             <a:br>
               <a:rPr lang="en-US" dirty="0">
@@ -15784,7 +16568,7 @@
                 <a:effectLst/>
                 <a:latin typeface="Calibri" panose="020F0502020204030204" pitchFamily="34" charset="0"/>
               </a:rPr>
-              <a:t>Don't get the wrong impression. SQL Server can be very secure and can meet the tightest federal security requirements to protect data from theft, destruction, and other types of malicious behavior. When operated properly.</a:t>
+              <a:t>A View can query across multiple databases, but permissions are assigned at the database level.</a:t>
             </a:r>
           </a:p>
         </p:txBody>
@@ -16054,7 +16838,7 @@
     </p:spTree>
     <p:extLst>
       <p:ext uri="{BB962C8B-B14F-4D97-AF65-F5344CB8AC3E}">
-        <p14:creationId xmlns:p14="http://schemas.microsoft.com/office/powerpoint/2010/main" val="4071109867"/>
+        <p14:creationId xmlns:p14="http://schemas.microsoft.com/office/powerpoint/2010/main" val="881419837"/>
       </p:ext>
     </p:extLst>
   </p:cSld>
@@ -16439,15 +17223,7 @@
           <a:p>
             <a:r>
               <a:rPr lang="en-US" dirty="0"/>
-              <a:t>What about Sysadmin (</a:t>
-            </a:r>
-            <a:r>
-              <a:rPr lang="en-US" dirty="0" err="1"/>
-              <a:t>sa</a:t>
-            </a:r>
-            <a:r>
-              <a:rPr lang="en-US" dirty="0"/>
-              <a:t>)?</a:t>
+              <a:t>What should happen?</a:t>
             </a:r>
           </a:p>
         </p:txBody>
@@ -16489,32 +17265,19 @@
               <a:buChar char="•"/>
             </a:pPr>
             <a:r>
-              <a:rPr lang="en-US" sz="2800" dirty="0">
+              <a:rPr lang="en-US" dirty="0">
                 <a:effectLst/>
                 <a:latin typeface="Calibri" panose="020F0502020204030204" pitchFamily="34" charset="0"/>
               </a:rPr>
-              <a:t>Sysadmin has full rights, including deleting logs and even the database</a:t>
+              <a:t>Principle of Least Privilege. Permissions should be to the absolute minimum needed to accomplish the task</a:t>
             </a:r>
             <a:br>
-              <a:rPr lang="en-US" sz="2800" dirty="0">
+              <a:rPr lang="en-US" dirty="0">
                 <a:effectLst/>
                 <a:latin typeface="Calibri" panose="020F0502020204030204" pitchFamily="34" charset="0"/>
               </a:rPr>
             </a:br>
-            <a:r>
-              <a:rPr lang="en-US" sz="2800" dirty="0">
-                <a:effectLst/>
-                <a:latin typeface="Calibri" panose="020F0502020204030204" pitchFamily="34" charset="0"/>
-              </a:rPr>
-              <a:t>How to track their activities for Audit?</a:t>
-            </a:r>
-            <a:br>
-              <a:rPr lang="en-US" sz="2800" dirty="0">
-                <a:effectLst/>
-                <a:latin typeface="Calibri" panose="020F0502020204030204" pitchFamily="34" charset="0"/>
-              </a:rPr>
-            </a:br>
-            <a:endParaRPr lang="en-US" sz="2800" dirty="0">
+            <a:endParaRPr lang="en-US" dirty="0">
               <a:effectLst/>
               <a:latin typeface="Calibri" panose="020F0502020204030204" pitchFamily="34" charset="0"/>
             </a:endParaRPr>
@@ -16531,107 +17294,21 @@
               <a:buChar char="•"/>
             </a:pPr>
             <a:r>
-              <a:rPr lang="en-US" sz="2800" dirty="0">
+              <a:rPr lang="en-US" dirty="0">
+                <a:latin typeface="Calibri" panose="020F0502020204030204" pitchFamily="34" charset="0"/>
+              </a:rPr>
+              <a:t>Windows users are preferred over SQL Users</a:t>
+            </a:r>
+            <a:br>
+              <a:rPr lang="en-US" dirty="0">
                 <a:effectLst/>
                 <a:latin typeface="Calibri" panose="020F0502020204030204" pitchFamily="34" charset="0"/>
               </a:rPr>
-              <a:t>One client uses IDERA SQL Compliance Manager</a:t>
-            </a:r>
-          </a:p>
-          <a:p>
-            <a:pPr lvl="1" fontAlgn="ctr">
-              <a:spcBef>
-                <a:spcPts val="0"/>
-              </a:spcBef>
-              <a:spcAft>
-                <a:spcPts val="0"/>
-              </a:spcAft>
-            </a:pPr>
-            <a:r>
-              <a:rPr lang="en-US" sz="2400" dirty="0">
-                <a:latin typeface="Calibri" panose="020F0502020204030204" pitchFamily="34" charset="0"/>
-              </a:rPr>
-              <a:t>Immediately saves a copy of any action with proprietary checksum attached</a:t>
-            </a:r>
-          </a:p>
-          <a:p>
-            <a:pPr lvl="1" fontAlgn="ctr">
-              <a:spcBef>
-                <a:spcPts val="0"/>
-              </a:spcBef>
-              <a:spcAft>
-                <a:spcPts val="0"/>
-              </a:spcAft>
-            </a:pPr>
-            <a:r>
-              <a:rPr lang="en-US" sz="2400" dirty="0">
-                <a:latin typeface="Calibri" panose="020F0502020204030204" pitchFamily="34" charset="0"/>
-              </a:rPr>
-              <a:t>Data sent to the console server every 10 minutes (configurable)</a:t>
-            </a:r>
-          </a:p>
-          <a:p>
-            <a:pPr lvl="1" fontAlgn="ctr">
-              <a:spcBef>
-                <a:spcPts val="0"/>
-              </a:spcBef>
-              <a:spcAft>
-                <a:spcPts val="0"/>
-              </a:spcAft>
-            </a:pPr>
-            <a:r>
-              <a:rPr lang="en-US" sz="2400" dirty="0">
-                <a:effectLst/>
-                <a:latin typeface="Calibri" panose="020F0502020204030204" pitchFamily="34" charset="0"/>
-              </a:rPr>
-              <a:t>Console will flag any change to the </a:t>
-            </a:r>
-            <a:r>
-              <a:rPr lang="en-US" sz="2400" dirty="0">
-                <a:latin typeface="Calibri" panose="020F0502020204030204" pitchFamily="34" charset="0"/>
-              </a:rPr>
-              <a:t>audit record because checksum will fail</a:t>
-            </a:r>
-          </a:p>
-          <a:p>
-            <a:pPr lvl="1" fontAlgn="ctr">
-              <a:spcBef>
-                <a:spcPts val="0"/>
-              </a:spcBef>
-              <a:spcAft>
-                <a:spcPts val="0"/>
-              </a:spcAft>
-            </a:pPr>
-            <a:r>
-              <a:rPr lang="en-US" sz="2400" dirty="0">
-                <a:effectLst/>
-                <a:latin typeface="Calibri" panose="020F0502020204030204" pitchFamily="34" charset="0"/>
-              </a:rPr>
-              <a:t>Multiple management reports available at the console</a:t>
-            </a:r>
-          </a:p>
-          <a:p>
-            <a:pPr lvl="1" fontAlgn="ctr">
-              <a:spcBef>
-                <a:spcPts val="0"/>
-              </a:spcBef>
-              <a:spcAft>
-                <a:spcPts val="0"/>
-              </a:spcAft>
-            </a:pPr>
-            <a:r>
-              <a:rPr lang="en-US" sz="2400" dirty="0">
-                <a:latin typeface="Calibri" panose="020F0502020204030204" pitchFamily="34" charset="0"/>
-              </a:rPr>
-              <a:t>Reports can include</a:t>
-            </a:r>
-            <a:r>
-              <a:rPr lang="en-US" sz="2400" dirty="0">
-                <a:effectLst/>
-                <a:latin typeface="Calibri" panose="020F0502020204030204" pitchFamily="34" charset="0"/>
-              </a:rPr>
-              <a:t> the actual SQL statements performed</a:t>
-            </a:r>
+            </a:br>
+            <a:endParaRPr lang="en-US" dirty="0">
+              <a:effectLst/>
+              <a:latin typeface="Calibri" panose="020F0502020204030204" pitchFamily="34" charset="0"/>
+            </a:endParaRPr>
           </a:p>
           <a:p>
             <a:pPr rtl="0" fontAlgn="ctr">
@@ -16644,10 +17321,55 @@
               <a:buFont typeface="Arial" panose="020B0604020202020204" pitchFamily="34" charset="0"/>
               <a:buChar char="•"/>
             </a:pPr>
-            <a:endParaRPr lang="en-US" sz="2800" dirty="0">
+            <a:r>
+              <a:rPr lang="en-US" dirty="0">
+                <a:effectLst/>
+                <a:latin typeface="Calibri" panose="020F0502020204030204" pitchFamily="34" charset="0"/>
+              </a:rPr>
+              <a:t>Security should be limited to specific schemas and provided by database roles</a:t>
+            </a:r>
+            <a:br>
+              <a:rPr lang="en-US" dirty="0">
+                <a:effectLst/>
+                <a:latin typeface="Calibri" panose="020F0502020204030204" pitchFamily="34" charset="0"/>
+              </a:rPr>
+            </a:br>
+            <a:r>
+              <a:rPr lang="en-US" dirty="0">
+                <a:effectLst/>
+                <a:latin typeface="Calibri" panose="020F0502020204030204" pitchFamily="34" charset="0"/>
+              </a:rPr>
+              <a:t>That will be explained later in this presentation</a:t>
+            </a:r>
+            <a:br>
+              <a:rPr lang="en-US" dirty="0">
+                <a:effectLst/>
+                <a:latin typeface="Calibri" panose="020F0502020204030204" pitchFamily="34" charset="0"/>
+              </a:rPr>
+            </a:br>
+            <a:endParaRPr lang="en-US" dirty="0">
               <a:effectLst/>
               <a:latin typeface="Calibri" panose="020F0502020204030204" pitchFamily="34" charset="0"/>
             </a:endParaRPr>
+          </a:p>
+          <a:p>
+            <a:pPr rtl="0" fontAlgn="ctr">
+              <a:spcBef>
+                <a:spcPts val="0"/>
+              </a:spcBef>
+              <a:spcAft>
+                <a:spcPts val="0"/>
+              </a:spcAft>
+              <a:buFont typeface="Arial" panose="020B0604020202020204" pitchFamily="34" charset="0"/>
+              <a:buChar char="•"/>
+            </a:pPr>
+            <a:r>
+              <a:rPr lang="en-US" dirty="0">
+                <a:effectLst/>
+                <a:latin typeface="Calibri" panose="020F0502020204030204" pitchFamily="34" charset="0"/>
+              </a:rPr>
+              <a:t>Don't get the wrong impression. SQL Server can be very secure and can meet the tightest federal security requirements to protect data from theft, destruction, and other types of malicious behavior. When operated properly.</a:t>
+            </a:r>
           </a:p>
         </p:txBody>
       </p:sp>
@@ -16916,7 +17638,7 @@
     </p:spTree>
     <p:extLst>
       <p:ext uri="{BB962C8B-B14F-4D97-AF65-F5344CB8AC3E}">
-        <p14:creationId xmlns:p14="http://schemas.microsoft.com/office/powerpoint/2010/main" val="359565232"/>
+        <p14:creationId xmlns:p14="http://schemas.microsoft.com/office/powerpoint/2010/main" val="2643253333"/>
       </p:ext>
     </p:extLst>
   </p:cSld>
@@ -17289,8 +18011,8 @@
         </p:nvSpPr>
         <p:spPr>
           <a:xfrm>
-            <a:off x="543586" y="1357443"/>
-            <a:ext cx="11097551" cy="772675"/>
+            <a:off x="550862" y="549275"/>
+            <a:ext cx="11097551" cy="1332000"/>
           </a:xfrm>
         </p:spPr>
         <p:txBody>
@@ -17299,11 +18021,217 @@
           </a:bodyPr>
           <a:lstStyle/>
           <a:p>
-            <a:pPr algn="ctr"/>
             <a:r>
               <a:rPr lang="en-US" dirty="0"/>
-              <a:t>DEMOS !!</a:t>
-            </a:r>
+              <a:t>What about Sysadmin (</a:t>
+            </a:r>
+            <a:r>
+              <a:rPr lang="en-US" dirty="0" err="1"/>
+              <a:t>sa</a:t>
+            </a:r>
+            <a:r>
+              <a:rPr lang="en-US" dirty="0"/>
+              <a:t>)?</a:t>
+            </a:r>
+          </a:p>
+        </p:txBody>
+      </p:sp>
+      <p:sp>
+        <p:nvSpPr>
+          <p:cNvPr id="10" name="Content Placeholder 9">
+            <a:extLst>
+              <a:ext uri="{FF2B5EF4-FFF2-40B4-BE49-F238E27FC236}">
+                <a16:creationId xmlns:a16="http://schemas.microsoft.com/office/drawing/2014/main" id="{1DB251F7-EBE7-46AC-A920-FFE2C5AF68EA}"/>
+              </a:ext>
+            </a:extLst>
+          </p:cNvPr>
+          <p:cNvSpPr>
+            <a:spLocks noGrp="1"/>
+          </p:cNvSpPr>
+          <p:nvPr>
+            <p:ph sz="half" idx="2"/>
+          </p:nvPr>
+        </p:nvSpPr>
+        <p:spPr>
+          <a:xfrm>
+            <a:off x="550863" y="1630016"/>
+            <a:ext cx="11090274" cy="4312909"/>
+          </a:xfrm>
+        </p:spPr>
+        <p:txBody>
+          <a:bodyPr/>
+          <a:lstStyle/>
+          <a:p>
+            <a:pPr rtl="0" fontAlgn="ctr">
+              <a:spcBef>
+                <a:spcPts val="0"/>
+              </a:spcBef>
+              <a:spcAft>
+                <a:spcPts val="0"/>
+              </a:spcAft>
+              <a:buFont typeface="Arial" panose="020B0604020202020204" pitchFamily="34" charset="0"/>
+              <a:buChar char="•"/>
+            </a:pPr>
+            <a:r>
+              <a:rPr lang="en-US" sz="2800" dirty="0">
+                <a:effectLst/>
+                <a:latin typeface="Calibri" panose="020F0502020204030204" pitchFamily="34" charset="0"/>
+              </a:rPr>
+              <a:t>Sysadmin has full rights, including deleting logs and even the database</a:t>
+            </a:r>
+            <a:br>
+              <a:rPr lang="en-US" sz="2800" dirty="0">
+                <a:effectLst/>
+                <a:latin typeface="Calibri" panose="020F0502020204030204" pitchFamily="34" charset="0"/>
+              </a:rPr>
+            </a:br>
+            <a:r>
+              <a:rPr lang="en-US" sz="2800" dirty="0">
+                <a:effectLst/>
+                <a:latin typeface="Calibri" panose="020F0502020204030204" pitchFamily="34" charset="0"/>
+              </a:rPr>
+              <a:t>How to track their activities for Audit?</a:t>
+            </a:r>
+            <a:br>
+              <a:rPr lang="en-US" sz="2800" dirty="0">
+                <a:effectLst/>
+                <a:latin typeface="Calibri" panose="020F0502020204030204" pitchFamily="34" charset="0"/>
+              </a:rPr>
+            </a:br>
+            <a:endParaRPr lang="en-US" sz="2800" dirty="0">
+              <a:effectLst/>
+              <a:latin typeface="Calibri" panose="020F0502020204030204" pitchFamily="34" charset="0"/>
+            </a:endParaRPr>
+          </a:p>
+          <a:p>
+            <a:pPr rtl="0" fontAlgn="ctr">
+              <a:spcBef>
+                <a:spcPts val="0"/>
+              </a:spcBef>
+              <a:spcAft>
+                <a:spcPts val="0"/>
+              </a:spcAft>
+              <a:buFont typeface="Arial" panose="020B0604020202020204" pitchFamily="34" charset="0"/>
+              <a:buChar char="•"/>
+            </a:pPr>
+            <a:r>
+              <a:rPr lang="en-US" sz="2800" dirty="0">
+                <a:effectLst/>
+                <a:latin typeface="Calibri" panose="020F0502020204030204" pitchFamily="34" charset="0"/>
+              </a:rPr>
+              <a:t>One client uses IDERA SQL Compliance Manager</a:t>
+            </a:r>
+          </a:p>
+          <a:p>
+            <a:pPr lvl="1" fontAlgn="ctr">
+              <a:spcBef>
+                <a:spcPts val="0"/>
+              </a:spcBef>
+              <a:spcAft>
+                <a:spcPts val="0"/>
+              </a:spcAft>
+            </a:pPr>
+            <a:r>
+              <a:rPr lang="en-US" sz="2400" dirty="0">
+                <a:latin typeface="Calibri" panose="020F0502020204030204" pitchFamily="34" charset="0"/>
+              </a:rPr>
+              <a:t>Immediately saves a copy of any action with proprietary checksum attached</a:t>
+            </a:r>
+          </a:p>
+          <a:p>
+            <a:pPr lvl="1" fontAlgn="ctr">
+              <a:spcBef>
+                <a:spcPts val="0"/>
+              </a:spcBef>
+              <a:spcAft>
+                <a:spcPts val="0"/>
+              </a:spcAft>
+            </a:pPr>
+            <a:r>
+              <a:rPr lang="en-US" sz="2400" dirty="0">
+                <a:latin typeface="Calibri" panose="020F0502020204030204" pitchFamily="34" charset="0"/>
+              </a:rPr>
+              <a:t>Data sent to the console server every 10 minutes (configurable)</a:t>
+            </a:r>
+          </a:p>
+          <a:p>
+            <a:pPr lvl="1" fontAlgn="ctr">
+              <a:spcBef>
+                <a:spcPts val="0"/>
+              </a:spcBef>
+              <a:spcAft>
+                <a:spcPts val="0"/>
+              </a:spcAft>
+            </a:pPr>
+            <a:r>
+              <a:rPr lang="en-US" sz="2400" dirty="0">
+                <a:effectLst/>
+                <a:latin typeface="Calibri" panose="020F0502020204030204" pitchFamily="34" charset="0"/>
+              </a:rPr>
+              <a:t>Console will flag any change to the </a:t>
+            </a:r>
+            <a:r>
+              <a:rPr lang="en-US" sz="2400" dirty="0">
+                <a:latin typeface="Calibri" panose="020F0502020204030204" pitchFamily="34" charset="0"/>
+              </a:rPr>
+              <a:t>audit record because checksum will fail</a:t>
+            </a:r>
+          </a:p>
+          <a:p>
+            <a:pPr lvl="1" fontAlgn="ctr">
+              <a:spcBef>
+                <a:spcPts val="0"/>
+              </a:spcBef>
+              <a:spcAft>
+                <a:spcPts val="0"/>
+              </a:spcAft>
+            </a:pPr>
+            <a:r>
+              <a:rPr lang="en-US" sz="2400" dirty="0">
+                <a:effectLst/>
+                <a:latin typeface="Calibri" panose="020F0502020204030204" pitchFamily="34" charset="0"/>
+              </a:rPr>
+              <a:t>Multiple management reports available at the console</a:t>
+            </a:r>
+          </a:p>
+          <a:p>
+            <a:pPr lvl="1" fontAlgn="ctr">
+              <a:spcBef>
+                <a:spcPts val="0"/>
+              </a:spcBef>
+              <a:spcAft>
+                <a:spcPts val="0"/>
+              </a:spcAft>
+            </a:pPr>
+            <a:r>
+              <a:rPr lang="en-US" sz="2400" dirty="0">
+                <a:latin typeface="Calibri" panose="020F0502020204030204" pitchFamily="34" charset="0"/>
+              </a:rPr>
+              <a:t>Reports can include</a:t>
+            </a:r>
+            <a:r>
+              <a:rPr lang="en-US" sz="2400" dirty="0">
+                <a:effectLst/>
+                <a:latin typeface="Calibri" panose="020F0502020204030204" pitchFamily="34" charset="0"/>
+              </a:rPr>
+              <a:t> the actual SQL statements performed</a:t>
+            </a:r>
+          </a:p>
+          <a:p>
+            <a:pPr rtl="0" fontAlgn="ctr">
+              <a:spcBef>
+                <a:spcPts val="0"/>
+              </a:spcBef>
+              <a:spcAft>
+                <a:spcPts val="0"/>
+              </a:spcAft>
+              <a:buFont typeface="Arial" panose="020B0604020202020204" pitchFamily="34" charset="0"/>
+              <a:buChar char="•"/>
+            </a:pPr>
+            <a:endParaRPr lang="en-US" sz="2800" dirty="0">
+              <a:effectLst/>
+              <a:latin typeface="Calibri" panose="020F0502020204030204" pitchFamily="34" charset="0"/>
+            </a:endParaRPr>
           </a:p>
         </p:txBody>
       </p:sp>
@@ -17569,121 +18497,10 @@
           </a:p>
         </p:txBody>
       </p:sp>
-      <p:sp>
-        <p:nvSpPr>
-          <p:cNvPr id="3" name="Content Placeholder 9">
-            <a:extLst>
-              <a:ext uri="{FF2B5EF4-FFF2-40B4-BE49-F238E27FC236}">
-                <a16:creationId xmlns:a16="http://schemas.microsoft.com/office/drawing/2014/main" id="{55BC838F-7D25-245D-A257-0556FD699AA8}"/>
-              </a:ext>
-            </a:extLst>
-          </p:cNvPr>
-          <p:cNvSpPr>
-            <a:spLocks noGrp="1"/>
-          </p:cNvSpPr>
-          <p:nvPr>
-            <p:ph sz="half" idx="2"/>
-          </p:nvPr>
-        </p:nvSpPr>
-        <p:spPr>
-          <a:xfrm>
-            <a:off x="550863" y="3132553"/>
-            <a:ext cx="11090274" cy="2810372"/>
-          </a:xfrm>
-        </p:spPr>
-        <p:txBody>
-          <a:bodyPr/>
-          <a:lstStyle/>
-          <a:p>
-            <a:pPr marL="0" indent="0" rtl="0" fontAlgn="ctr">
-              <a:spcBef>
-                <a:spcPts val="0"/>
-              </a:spcBef>
-              <a:spcAft>
-                <a:spcPts val="0"/>
-              </a:spcAft>
-              <a:buNone/>
-            </a:pPr>
-            <a:r>
-              <a:rPr lang="en-US" sz="2800" dirty="0">
-                <a:effectLst/>
-                <a:latin typeface="Calibri" panose="020F0502020204030204" pitchFamily="34" charset="0"/>
-              </a:rPr>
-              <a:t>You can practice these demos yourself on any Windows laptop or PC</a:t>
-            </a:r>
-            <a:br>
-              <a:rPr lang="en-US" sz="2800" dirty="0">
-                <a:effectLst/>
-                <a:latin typeface="Calibri" panose="020F0502020204030204" pitchFamily="34" charset="0"/>
-              </a:rPr>
-            </a:br>
-            <a:r>
-              <a:rPr lang="en-US" sz="2800" dirty="0">
-                <a:effectLst/>
-                <a:latin typeface="Calibri" panose="020F0502020204030204" pitchFamily="34" charset="0"/>
-              </a:rPr>
-              <a:t>using SQL Server Developer Edition. </a:t>
-            </a:r>
-            <a:r>
-              <a:rPr lang="en-US" sz="2800" dirty="0">
-                <a:latin typeface="Calibri" panose="020F0502020204030204" pitchFamily="34" charset="0"/>
-              </a:rPr>
-              <a:t>Available for each major release.</a:t>
-            </a:r>
-            <a:endParaRPr lang="en-US" sz="2800" dirty="0">
-              <a:effectLst/>
-              <a:latin typeface="Calibri" panose="020F0502020204030204" pitchFamily="34" charset="0"/>
-            </a:endParaRPr>
-          </a:p>
-          <a:p>
-            <a:pPr rtl="0" fontAlgn="ctr">
-              <a:spcBef>
-                <a:spcPts val="0"/>
-              </a:spcBef>
-              <a:spcAft>
-                <a:spcPts val="0"/>
-              </a:spcAft>
-              <a:buFont typeface="Arial" panose="020B0604020202020204" pitchFamily="34" charset="0"/>
-              <a:buChar char="•"/>
-            </a:pPr>
-            <a:endParaRPr lang="en-US" sz="2800" dirty="0">
-              <a:latin typeface="Calibri" panose="020F0502020204030204" pitchFamily="34" charset="0"/>
-            </a:endParaRPr>
-          </a:p>
-          <a:p>
-            <a:pPr marL="0" indent="0" rtl="0" fontAlgn="ctr">
-              <a:spcBef>
-                <a:spcPts val="0"/>
-              </a:spcBef>
-              <a:spcAft>
-                <a:spcPts val="0"/>
-              </a:spcAft>
-              <a:buNone/>
-            </a:pPr>
-            <a:r>
-              <a:rPr lang="en-US" sz="2800" dirty="0">
-                <a:effectLst/>
-                <a:latin typeface="Calibri" panose="020F0502020204030204" pitchFamily="34" charset="0"/>
-              </a:rPr>
-              <a:t>SQL Server Developer Edition is a free single user version of the full corporate Enterprise edition with all features enabled.</a:t>
-            </a:r>
-            <a:br>
-              <a:rPr lang="en-US" sz="2800" dirty="0">
-                <a:effectLst/>
-                <a:latin typeface="Calibri" panose="020F0502020204030204" pitchFamily="34" charset="0"/>
-              </a:rPr>
-            </a:br>
-            <a:endParaRPr lang="en-US" sz="2800" dirty="0">
-              <a:effectLst/>
-              <a:latin typeface="Calibri" panose="020F0502020204030204" pitchFamily="34" charset="0"/>
-            </a:endParaRPr>
-          </a:p>
-        </p:txBody>
-      </p:sp>
     </p:spTree>
     <p:extLst>
       <p:ext uri="{BB962C8B-B14F-4D97-AF65-F5344CB8AC3E}">
-        <p14:creationId xmlns:p14="http://schemas.microsoft.com/office/powerpoint/2010/main" val="4122103672"/>
+        <p14:creationId xmlns:p14="http://schemas.microsoft.com/office/powerpoint/2010/main" val="359565232"/>
       </p:ext>
     </p:extLst>
   </p:cSld>
@@ -18056,7 +18873,7 @@
         </p:nvSpPr>
         <p:spPr>
           <a:xfrm>
-            <a:off x="550862" y="549275"/>
+            <a:off x="543586" y="1357443"/>
             <a:ext cx="11097551" cy="772675"/>
           </a:xfrm>
         </p:spPr>
@@ -18066,253 +18883,10 @@
           </a:bodyPr>
           <a:lstStyle/>
           <a:p>
+            <a:pPr algn="ctr"/>
             <a:r>
               <a:rPr lang="en-US" dirty="0"/>
-              <a:t>Recap</a:t>
-            </a:r>
-          </a:p>
-        </p:txBody>
-      </p:sp>
-      <p:sp>
-        <p:nvSpPr>
-          <p:cNvPr id="10" name="Content Placeholder 9">
-            <a:extLst>
-              <a:ext uri="{FF2B5EF4-FFF2-40B4-BE49-F238E27FC236}">
-                <a16:creationId xmlns:a16="http://schemas.microsoft.com/office/drawing/2014/main" id="{1DB251F7-EBE7-46AC-A920-FFE2C5AF68EA}"/>
-              </a:ext>
-            </a:extLst>
-          </p:cNvPr>
-          <p:cNvSpPr>
-            <a:spLocks noGrp="1"/>
-          </p:cNvSpPr>
-          <p:nvPr>
-            <p:ph sz="half" idx="2"/>
-          </p:nvPr>
-        </p:nvSpPr>
-        <p:spPr>
-          <a:xfrm>
-            <a:off x="550863" y="1630016"/>
-            <a:ext cx="11090274" cy="4312909"/>
-          </a:xfrm>
-        </p:spPr>
-        <p:txBody>
-          <a:bodyPr/>
-          <a:lstStyle/>
-          <a:p>
-            <a:pPr rtl="0" fontAlgn="ctr">
-              <a:spcBef>
-                <a:spcPts val="0"/>
-              </a:spcBef>
-              <a:spcAft>
-                <a:spcPts val="0"/>
-              </a:spcAft>
-              <a:buFont typeface="Arial" panose="020B0604020202020204" pitchFamily="34" charset="0"/>
-              <a:buChar char="•"/>
-            </a:pPr>
-            <a:r>
-              <a:rPr lang="en-US" dirty="0">
-                <a:effectLst/>
-                <a:latin typeface="Calibri" panose="020F0502020204030204" pitchFamily="34" charset="0"/>
-              </a:rPr>
-              <a:t>Never give more permissions </a:t>
-            </a:r>
-            <a:r>
-              <a:rPr lang="en-US" dirty="0">
-                <a:latin typeface="Calibri" panose="020F0502020204030204" pitchFamily="34" charset="0"/>
-              </a:rPr>
-              <a:t>than needed </a:t>
-            </a:r>
-            <a:r>
-              <a:rPr lang="en-US" dirty="0">
-                <a:effectLst/>
-                <a:latin typeface="Calibri" panose="020F0502020204030204" pitchFamily="34" charset="0"/>
-              </a:rPr>
-              <a:t>to accomplish the tasks</a:t>
-            </a:r>
-            <a:br>
-              <a:rPr lang="en-US" dirty="0">
-                <a:effectLst/>
-                <a:latin typeface="Calibri" panose="020F0502020204030204" pitchFamily="34" charset="0"/>
-              </a:rPr>
-            </a:br>
-            <a:endParaRPr lang="en-US" dirty="0">
-              <a:effectLst/>
-              <a:latin typeface="Calibri" panose="020F0502020204030204" pitchFamily="34" charset="0"/>
-            </a:endParaRPr>
-          </a:p>
-          <a:p>
-            <a:pPr rtl="0" fontAlgn="ctr">
-              <a:spcBef>
-                <a:spcPts val="0"/>
-              </a:spcBef>
-              <a:spcAft>
-                <a:spcPts val="0"/>
-              </a:spcAft>
-              <a:buFont typeface="Arial" panose="020B0604020202020204" pitchFamily="34" charset="0"/>
-              <a:buChar char="•"/>
-            </a:pPr>
-            <a:r>
-              <a:rPr lang="en-US" dirty="0">
-                <a:effectLst/>
-                <a:latin typeface="Calibri" panose="020F0502020204030204" pitchFamily="34" charset="0"/>
-              </a:rPr>
-              <a:t>Assign permissions to database roles and add/remove members in those roles</a:t>
-            </a:r>
-          </a:p>
-          <a:p>
-            <a:pPr rtl="0" fontAlgn="ctr">
-              <a:spcBef>
-                <a:spcPts val="0"/>
-              </a:spcBef>
-              <a:spcAft>
-                <a:spcPts val="0"/>
-              </a:spcAft>
-              <a:buFont typeface="Arial" panose="020B0604020202020204" pitchFamily="34" charset="0"/>
-              <a:buChar char="•"/>
-            </a:pPr>
-            <a:endParaRPr lang="en-US" dirty="0">
-              <a:effectLst/>
-              <a:latin typeface="Calibri" panose="020F0502020204030204" pitchFamily="34" charset="0"/>
-            </a:endParaRPr>
-          </a:p>
-          <a:p>
-            <a:pPr rtl="0" fontAlgn="ctr">
-              <a:spcBef>
-                <a:spcPts val="0"/>
-              </a:spcBef>
-              <a:spcAft>
-                <a:spcPts val="0"/>
-              </a:spcAft>
-              <a:buFont typeface="Arial" panose="020B0604020202020204" pitchFamily="34" charset="0"/>
-              <a:buChar char="•"/>
-            </a:pPr>
-            <a:r>
-              <a:rPr lang="en-US" dirty="0">
-                <a:latin typeface="Calibri" panose="020F0502020204030204" pitchFamily="34" charset="0"/>
-              </a:rPr>
-              <a:t>Restrict user objects to </a:t>
-            </a:r>
-            <a:r>
-              <a:rPr lang="en-US" dirty="0">
-                <a:effectLst/>
-                <a:latin typeface="Calibri" panose="020F0502020204030204" pitchFamily="34" charset="0"/>
-              </a:rPr>
-              <a:t>specific schemas </a:t>
-            </a:r>
-            <a:r>
-              <a:rPr lang="en-US" dirty="0">
-                <a:latin typeface="Calibri" panose="020F0502020204030204" pitchFamily="34" charset="0"/>
-              </a:rPr>
-              <a:t>with permissions provided </a:t>
-            </a:r>
-            <a:r>
-              <a:rPr lang="en-US" dirty="0">
-                <a:effectLst/>
-                <a:latin typeface="Calibri" panose="020F0502020204030204" pitchFamily="34" charset="0"/>
-              </a:rPr>
-              <a:t>by database roles</a:t>
-            </a:r>
-          </a:p>
-          <a:p>
-            <a:pPr rtl="0" fontAlgn="ctr">
-              <a:spcBef>
-                <a:spcPts val="0"/>
-              </a:spcBef>
-              <a:spcAft>
-                <a:spcPts val="0"/>
-              </a:spcAft>
-              <a:buFont typeface="Arial" panose="020B0604020202020204" pitchFamily="34" charset="0"/>
-              <a:buChar char="•"/>
-            </a:pPr>
-            <a:endParaRPr lang="en-US" dirty="0">
-              <a:latin typeface="Calibri" panose="020F0502020204030204" pitchFamily="34" charset="0"/>
-            </a:endParaRPr>
-          </a:p>
-          <a:p>
-            <a:pPr rtl="0" fontAlgn="ctr">
-              <a:spcBef>
-                <a:spcPts val="0"/>
-              </a:spcBef>
-              <a:spcAft>
-                <a:spcPts val="0"/>
-              </a:spcAft>
-              <a:buFont typeface="Arial" panose="020B0604020202020204" pitchFamily="34" charset="0"/>
-              <a:buChar char="•"/>
-            </a:pPr>
-            <a:r>
-              <a:rPr lang="en-US" dirty="0">
-                <a:latin typeface="Calibri" panose="020F0502020204030204" pitchFamily="34" charset="0"/>
-              </a:rPr>
-              <a:t>Use No Login SQL users to execute stored procedures</a:t>
-            </a:r>
-            <a:r>
-              <a:rPr lang="en-US" dirty="0">
-                <a:effectLst/>
-                <a:latin typeface="Calibri" panose="020F0502020204030204" pitchFamily="34" charset="0"/>
-              </a:rPr>
-              <a:t> </a:t>
-            </a:r>
-          </a:p>
-          <a:p>
-            <a:pPr rtl="0" fontAlgn="ctr">
-              <a:spcBef>
-                <a:spcPts val="0"/>
-              </a:spcBef>
-              <a:spcAft>
-                <a:spcPts val="0"/>
-              </a:spcAft>
-              <a:buFont typeface="Arial" panose="020B0604020202020204" pitchFamily="34" charset="0"/>
-              <a:buChar char="•"/>
-            </a:pPr>
-            <a:endParaRPr lang="en-US" dirty="0">
-              <a:latin typeface="Calibri" panose="020F0502020204030204" pitchFamily="34" charset="0"/>
-            </a:endParaRPr>
-          </a:p>
-          <a:p>
-            <a:pPr rtl="0" fontAlgn="ctr">
-              <a:spcBef>
-                <a:spcPts val="0"/>
-              </a:spcBef>
-              <a:spcAft>
-                <a:spcPts val="0"/>
-              </a:spcAft>
-              <a:buFont typeface="Arial" panose="020B0604020202020204" pitchFamily="34" charset="0"/>
-              <a:buChar char="•"/>
-            </a:pPr>
-            <a:r>
-              <a:rPr lang="en-US" dirty="0">
-                <a:latin typeface="Calibri" panose="020F0502020204030204" pitchFamily="34" charset="0"/>
-              </a:rPr>
-              <a:t>When necessary, create SQL Users with complex passwords</a:t>
-            </a:r>
-            <a:br>
-              <a:rPr lang="en-US" dirty="0">
-                <a:effectLst/>
-                <a:latin typeface="Calibri" panose="020F0502020204030204" pitchFamily="34" charset="0"/>
-              </a:rPr>
-            </a:br>
-            <a:endParaRPr lang="en-US" dirty="0">
-              <a:effectLst/>
-              <a:latin typeface="Calibri" panose="020F0502020204030204" pitchFamily="34" charset="0"/>
-            </a:endParaRPr>
-          </a:p>
-          <a:p>
-            <a:pPr rtl="0" fontAlgn="ctr">
-              <a:spcBef>
-                <a:spcPts val="0"/>
-              </a:spcBef>
-              <a:spcAft>
-                <a:spcPts val="0"/>
-              </a:spcAft>
-              <a:buFont typeface="Arial" panose="020B0604020202020204" pitchFamily="34" charset="0"/>
-              <a:buChar char="•"/>
-            </a:pPr>
-            <a:r>
-              <a:rPr lang="en-US" dirty="0">
-                <a:effectLst/>
-                <a:latin typeface="Calibri" panose="020F0502020204030204" pitchFamily="34" charset="0"/>
-              </a:rPr>
-              <a:t>Audit user permissions on a regular basis using the script I showed or other tools</a:t>
+              <a:t>DEMOS !!</a:t>
             </a:r>
           </a:p>
         </p:txBody>
@@ -18579,10 +19153,121 @@
           </a:p>
         </p:txBody>
       </p:sp>
+      <p:sp>
+        <p:nvSpPr>
+          <p:cNvPr id="3" name="Content Placeholder 9">
+            <a:extLst>
+              <a:ext uri="{FF2B5EF4-FFF2-40B4-BE49-F238E27FC236}">
+                <a16:creationId xmlns:a16="http://schemas.microsoft.com/office/drawing/2014/main" id="{55BC838F-7D25-245D-A257-0556FD699AA8}"/>
+              </a:ext>
+            </a:extLst>
+          </p:cNvPr>
+          <p:cNvSpPr>
+            <a:spLocks noGrp="1"/>
+          </p:cNvSpPr>
+          <p:nvPr>
+            <p:ph sz="half" idx="2"/>
+          </p:nvPr>
+        </p:nvSpPr>
+        <p:spPr>
+          <a:xfrm>
+            <a:off x="550863" y="3132553"/>
+            <a:ext cx="11090274" cy="2810372"/>
+          </a:xfrm>
+        </p:spPr>
+        <p:txBody>
+          <a:bodyPr/>
+          <a:lstStyle/>
+          <a:p>
+            <a:pPr marL="0" indent="0" rtl="0" fontAlgn="ctr">
+              <a:spcBef>
+                <a:spcPts val="0"/>
+              </a:spcBef>
+              <a:spcAft>
+                <a:spcPts val="0"/>
+              </a:spcAft>
+              <a:buNone/>
+            </a:pPr>
+            <a:r>
+              <a:rPr lang="en-US" sz="2800" dirty="0">
+                <a:effectLst/>
+                <a:latin typeface="Calibri" panose="020F0502020204030204" pitchFamily="34" charset="0"/>
+              </a:rPr>
+              <a:t>You can practice these demos yourself on any Windows laptop or PC</a:t>
+            </a:r>
+            <a:br>
+              <a:rPr lang="en-US" sz="2800" dirty="0">
+                <a:effectLst/>
+                <a:latin typeface="Calibri" panose="020F0502020204030204" pitchFamily="34" charset="0"/>
+              </a:rPr>
+            </a:br>
+            <a:r>
+              <a:rPr lang="en-US" sz="2800" dirty="0">
+                <a:effectLst/>
+                <a:latin typeface="Calibri" panose="020F0502020204030204" pitchFamily="34" charset="0"/>
+              </a:rPr>
+              <a:t>using SQL Server Developer Edition. </a:t>
+            </a:r>
+            <a:r>
+              <a:rPr lang="en-US" sz="2800" dirty="0">
+                <a:latin typeface="Calibri" panose="020F0502020204030204" pitchFamily="34" charset="0"/>
+              </a:rPr>
+              <a:t>Available for each major release.</a:t>
+            </a:r>
+            <a:endParaRPr lang="en-US" sz="2800" dirty="0">
+              <a:effectLst/>
+              <a:latin typeface="Calibri" panose="020F0502020204030204" pitchFamily="34" charset="0"/>
+            </a:endParaRPr>
+          </a:p>
+          <a:p>
+            <a:pPr rtl="0" fontAlgn="ctr">
+              <a:spcBef>
+                <a:spcPts val="0"/>
+              </a:spcBef>
+              <a:spcAft>
+                <a:spcPts val="0"/>
+              </a:spcAft>
+              <a:buFont typeface="Arial" panose="020B0604020202020204" pitchFamily="34" charset="0"/>
+              <a:buChar char="•"/>
+            </a:pPr>
+            <a:endParaRPr lang="en-US" sz="2800" dirty="0">
+              <a:latin typeface="Calibri" panose="020F0502020204030204" pitchFamily="34" charset="0"/>
+            </a:endParaRPr>
+          </a:p>
+          <a:p>
+            <a:pPr marL="0" indent="0" rtl="0" fontAlgn="ctr">
+              <a:spcBef>
+                <a:spcPts val="0"/>
+              </a:spcBef>
+              <a:spcAft>
+                <a:spcPts val="0"/>
+              </a:spcAft>
+              <a:buNone/>
+            </a:pPr>
+            <a:r>
+              <a:rPr lang="en-US" sz="2800" dirty="0">
+                <a:effectLst/>
+                <a:latin typeface="Calibri" panose="020F0502020204030204" pitchFamily="34" charset="0"/>
+              </a:rPr>
+              <a:t>SQL Server Developer Edition is a free single user version of the full corporate Enterprise edition with all features enabled.</a:t>
+            </a:r>
+            <a:br>
+              <a:rPr lang="en-US" sz="2800" dirty="0">
+                <a:effectLst/>
+                <a:latin typeface="Calibri" panose="020F0502020204030204" pitchFamily="34" charset="0"/>
+              </a:rPr>
+            </a:br>
+            <a:endParaRPr lang="en-US" sz="2800" dirty="0">
+              <a:effectLst/>
+              <a:latin typeface="Calibri" panose="020F0502020204030204" pitchFamily="34" charset="0"/>
+            </a:endParaRPr>
+          </a:p>
+        </p:txBody>
+      </p:sp>
     </p:spTree>
     <p:extLst>
       <p:ext uri="{BB962C8B-B14F-4D97-AF65-F5344CB8AC3E}">
-        <p14:creationId xmlns:p14="http://schemas.microsoft.com/office/powerpoint/2010/main" val="2112465238"/>
+        <p14:creationId xmlns:p14="http://schemas.microsoft.com/office/powerpoint/2010/main" val="4122103672"/>
       </p:ext>
     </p:extLst>
   </p:cSld>
@@ -18609,12 +19294,340 @@
           <a:chExt cx="0" cy="0"/>
         </a:xfrm>
       </p:grpSpPr>
-      <p:sp>
-        <p:nvSpPr>
-          <p:cNvPr id="11" name="Title 10">
+      <p:grpSp>
+        <p:nvGrpSpPr>
+          <p:cNvPr id="25" name="Group 24">
             <a:extLst>
               <a:ext uri="{FF2B5EF4-FFF2-40B4-BE49-F238E27FC236}">
-                <a16:creationId xmlns:a16="http://schemas.microsoft.com/office/drawing/2014/main" id="{581E8936-2270-47FE-94A4-398CB123EF90}"/>
+                <a16:creationId xmlns:a16="http://schemas.microsoft.com/office/drawing/2014/main" id="{D10F3D66-0109-4903-90B9-66D0E288F721}"/>
+              </a:ext>
+              <a:ext uri="{C183D7F6-B498-43B3-948B-1728B52AA6E4}">
+                <adec:decorative xmlns:adec="http://schemas.microsoft.com/office/drawing/2017/decorative" val="1"/>
+              </a:ext>
+            </a:extLst>
+          </p:cNvPr>
+          <p:cNvGrpSpPr/>
+          <p:nvPr/>
+        </p:nvGrpSpPr>
+        <p:grpSpPr>
+          <a:xfrm>
+            <a:off x="10379261" y="2030035"/>
+            <a:ext cx="1335600" cy="1262947"/>
+            <a:chOff x="10145015" y="2343978"/>
+            <a:chExt cx="1335600" cy="1262947"/>
+          </a:xfrm>
+        </p:grpSpPr>
+        <p:sp>
+          <p:nvSpPr>
+            <p:cNvPr id="26" name="Freeform: Shape 25">
+              <a:extLst>
+                <a:ext uri="{FF2B5EF4-FFF2-40B4-BE49-F238E27FC236}">
+                  <a16:creationId xmlns:a16="http://schemas.microsoft.com/office/drawing/2014/main" id="{57DAB968-9B52-4EFF-AD39-7657DFEA6E48}"/>
+                </a:ext>
+              </a:extLst>
+            </p:cNvPr>
+            <p:cNvSpPr>
+              <a:spLocks noChangeAspect="1"/>
+            </p:cNvSpPr>
+            <p:nvPr/>
+          </p:nvSpPr>
+          <p:spPr>
+            <a:xfrm rot="8100000">
+              <a:off x="10400615" y="2343978"/>
+              <a:ext cx="1080000" cy="1262947"/>
+            </a:xfrm>
+            <a:custGeom>
+              <a:avLst/>
+              <a:gdLst>
+                <a:gd name="connsiteX0" fmla="*/ 540000 w 1080000"/>
+                <a:gd name="connsiteY0" fmla="*/ 0 h 1262947"/>
+                <a:gd name="connsiteX1" fmla="*/ 1080000 w 1080000"/>
+                <a:gd name="connsiteY1" fmla="*/ 931034 h 1262947"/>
+                <a:gd name="connsiteX2" fmla="*/ 1064374 w 1080000"/>
+                <a:gd name="connsiteY2" fmla="*/ 931034 h 1262947"/>
+                <a:gd name="connsiteX3" fmla="*/ 1069029 w 1080000"/>
+                <a:gd name="connsiteY3" fmla="*/ 938533 h 1262947"/>
+                <a:gd name="connsiteX4" fmla="*/ 1080000 w 1080000"/>
+                <a:gd name="connsiteY4" fmla="*/ 992947 h 1262947"/>
+                <a:gd name="connsiteX5" fmla="*/ 540000 w 1080000"/>
+                <a:gd name="connsiteY5" fmla="*/ 1262947 h 1262947"/>
+                <a:gd name="connsiteX6" fmla="*/ 0 w 1080000"/>
+                <a:gd name="connsiteY6" fmla="*/ 992947 h 1262947"/>
+                <a:gd name="connsiteX7" fmla="*/ 10971 w 1080000"/>
+                <a:gd name="connsiteY7" fmla="*/ 938533 h 1262947"/>
+                <a:gd name="connsiteX8" fmla="*/ 15626 w 1080000"/>
+                <a:gd name="connsiteY8" fmla="*/ 931034 h 1262947"/>
+                <a:gd name="connsiteX9" fmla="*/ 0 w 1080000"/>
+                <a:gd name="connsiteY9" fmla="*/ 931034 h 1262947"/>
+                <a:gd name="connsiteX0" fmla="*/ 540000 w 1080000"/>
+                <a:gd name="connsiteY0" fmla="*/ 0 h 1262947"/>
+                <a:gd name="connsiteX1" fmla="*/ 1080000 w 1080000"/>
+                <a:gd name="connsiteY1" fmla="*/ 931034 h 1262947"/>
+                <a:gd name="connsiteX2" fmla="*/ 1064374 w 1080000"/>
+                <a:gd name="connsiteY2" fmla="*/ 931034 h 1262947"/>
+                <a:gd name="connsiteX3" fmla="*/ 1069029 w 1080000"/>
+                <a:gd name="connsiteY3" fmla="*/ 938533 h 1262947"/>
+                <a:gd name="connsiteX4" fmla="*/ 1080000 w 1080000"/>
+                <a:gd name="connsiteY4" fmla="*/ 992947 h 1262947"/>
+                <a:gd name="connsiteX5" fmla="*/ 540000 w 1080000"/>
+                <a:gd name="connsiteY5" fmla="*/ 1262947 h 1262947"/>
+                <a:gd name="connsiteX6" fmla="*/ 0 w 1080000"/>
+                <a:gd name="connsiteY6" fmla="*/ 992947 h 1262947"/>
+                <a:gd name="connsiteX7" fmla="*/ 10971 w 1080000"/>
+                <a:gd name="connsiteY7" fmla="*/ 938533 h 1262947"/>
+                <a:gd name="connsiteX8" fmla="*/ 15626 w 1080000"/>
+                <a:gd name="connsiteY8" fmla="*/ 931034 h 1262947"/>
+                <a:gd name="connsiteX9" fmla="*/ 540000 w 1080000"/>
+                <a:gd name="connsiteY9" fmla="*/ 0 h 1262947"/>
+                <a:gd name="connsiteX0" fmla="*/ 540000 w 1080000"/>
+                <a:gd name="connsiteY0" fmla="*/ 0 h 1262947"/>
+                <a:gd name="connsiteX1" fmla="*/ 1064374 w 1080000"/>
+                <a:gd name="connsiteY1" fmla="*/ 931034 h 1262947"/>
+                <a:gd name="connsiteX2" fmla="*/ 1069029 w 1080000"/>
+                <a:gd name="connsiteY2" fmla="*/ 938533 h 1262947"/>
+                <a:gd name="connsiteX3" fmla="*/ 1080000 w 1080000"/>
+                <a:gd name="connsiteY3" fmla="*/ 992947 h 1262947"/>
+                <a:gd name="connsiteX4" fmla="*/ 540000 w 1080000"/>
+                <a:gd name="connsiteY4" fmla="*/ 1262947 h 1262947"/>
+                <a:gd name="connsiteX5" fmla="*/ 0 w 1080000"/>
+                <a:gd name="connsiteY5" fmla="*/ 992947 h 1262947"/>
+                <a:gd name="connsiteX6" fmla="*/ 10971 w 1080000"/>
+                <a:gd name="connsiteY6" fmla="*/ 938533 h 1262947"/>
+                <a:gd name="connsiteX7" fmla="*/ 15626 w 1080000"/>
+                <a:gd name="connsiteY7" fmla="*/ 931034 h 1262947"/>
+                <a:gd name="connsiteX8" fmla="*/ 540000 w 1080000"/>
+                <a:gd name="connsiteY8" fmla="*/ 0 h 1262947"/>
+              </a:gdLst>
+              <a:ahLst/>
+              <a:cxnLst>
+                <a:cxn ang="0">
+                  <a:pos x="connsiteX0" y="connsiteY0"/>
+                </a:cxn>
+                <a:cxn ang="0">
+                  <a:pos x="connsiteX1" y="connsiteY1"/>
+                </a:cxn>
+                <a:cxn ang="0">
+                  <a:pos x="connsiteX2" y="connsiteY2"/>
+                </a:cxn>
+                <a:cxn ang="0">
+                  <a:pos x="connsiteX3" y="connsiteY3"/>
+                </a:cxn>
+                <a:cxn ang="0">
+                  <a:pos x="connsiteX4" y="connsiteY4"/>
+                </a:cxn>
+                <a:cxn ang="0">
+                  <a:pos x="connsiteX5" y="connsiteY5"/>
+                </a:cxn>
+                <a:cxn ang="0">
+                  <a:pos x="connsiteX6" y="connsiteY6"/>
+                </a:cxn>
+                <a:cxn ang="0">
+                  <a:pos x="connsiteX7" y="connsiteY7"/>
+                </a:cxn>
+                <a:cxn ang="0">
+                  <a:pos x="connsiteX8" y="connsiteY8"/>
+                </a:cxn>
+              </a:cxnLst>
+              <a:rect l="l" t="t" r="r" b="b"/>
+              <a:pathLst>
+                <a:path w="1080000" h="1262947">
+                  <a:moveTo>
+                    <a:pt x="540000" y="0"/>
+                  </a:moveTo>
+                  <a:lnTo>
+                    <a:pt x="1064374" y="931034"/>
+                  </a:lnTo>
+                  <a:lnTo>
+                    <a:pt x="1069029" y="938533"/>
+                  </a:lnTo>
+                  <a:cubicBezTo>
+                    <a:pt x="1076223" y="956109"/>
+                    <a:pt x="1080000" y="974307"/>
+                    <a:pt x="1080000" y="992947"/>
+                  </a:cubicBezTo>
+                  <a:cubicBezTo>
+                    <a:pt x="1080000" y="1142064"/>
+                    <a:pt x="838234" y="1262947"/>
+                    <a:pt x="540000" y="1262947"/>
+                  </a:cubicBezTo>
+                  <a:cubicBezTo>
+                    <a:pt x="241766" y="1262947"/>
+                    <a:pt x="0" y="1142064"/>
+                    <a:pt x="0" y="992947"/>
+                  </a:cubicBezTo>
+                  <a:cubicBezTo>
+                    <a:pt x="0" y="974307"/>
+                    <a:pt x="3778" y="956109"/>
+                    <a:pt x="10971" y="938533"/>
+                  </a:cubicBezTo>
+                  <a:lnTo>
+                    <a:pt x="15626" y="931034"/>
+                  </a:lnTo>
+                  <a:lnTo>
+                    <a:pt x="540000" y="0"/>
+                  </a:lnTo>
+                  <a:close/>
+                </a:path>
+              </a:pathLst>
+            </a:custGeom>
+            <a:gradFill>
+              <a:gsLst>
+                <a:gs pos="60000">
+                  <a:schemeClr val="bg2">
+                    <a:lumMod val="90000"/>
+                    <a:lumOff val="10000"/>
+                  </a:schemeClr>
+                </a:gs>
+                <a:gs pos="30000">
+                  <a:schemeClr val="bg2">
+                    <a:lumMod val="90000"/>
+                    <a:lumOff val="10000"/>
+                  </a:schemeClr>
+                </a:gs>
+                <a:gs pos="40000">
+                  <a:schemeClr val="bg2">
+                    <a:lumMod val="80000"/>
+                    <a:lumOff val="20000"/>
+                  </a:schemeClr>
+                </a:gs>
+                <a:gs pos="100000">
+                  <a:schemeClr val="bg2"/>
+                </a:gs>
+              </a:gsLst>
+              <a:lin ang="600000" scaled="0"/>
+            </a:gradFill>
+            <a:ln>
+              <a:noFill/>
+            </a:ln>
+            <a:effectLst>
+              <a:innerShdw blurRad="254000" dist="101600" dir="7320000">
+                <a:schemeClr val="accent1">
+                  <a:lumMod val="60000"/>
+                  <a:lumOff val="40000"/>
+                  <a:alpha val="40000"/>
+                </a:schemeClr>
+              </a:innerShdw>
+            </a:effectLst>
+          </p:spPr>
+          <p:style>
+            <a:lnRef idx="2">
+              <a:schemeClr val="accent1">
+                <a:shade val="50000"/>
+              </a:schemeClr>
+            </a:lnRef>
+            <a:fillRef idx="1">
+              <a:schemeClr val="accent1"/>
+            </a:fillRef>
+            <a:effectRef idx="0">
+              <a:schemeClr val="accent1"/>
+            </a:effectRef>
+            <a:fontRef idx="minor">
+              <a:schemeClr val="lt1"/>
+            </a:fontRef>
+          </p:style>
+          <p:txBody>
+            <a:bodyPr rot="0" spcFirstLastPara="0" vertOverflow="overflow" horzOverflow="overflow" vert="horz" wrap="square" lIns="91440" tIns="45720" rIns="91440" bIns="45720" numCol="1" spcCol="0" rtlCol="0" fromWordArt="0" anchor="ctr" anchorCtr="0" forceAA="0" compatLnSpc="1">
+              <a:prstTxWarp prst="textNoShape">
+                <a:avLst/>
+              </a:prstTxWarp>
+              <a:noAutofit/>
+            </a:bodyPr>
+            <a:lstStyle/>
+            <a:p>
+              <a:pPr algn="ctr"/>
+              <a:endParaRPr lang="en-US"/>
+            </a:p>
+          </p:txBody>
+        </p:sp>
+        <p:sp>
+          <p:nvSpPr>
+            <p:cNvPr id="27" name="Oval 26">
+              <a:extLst>
+                <a:ext uri="{FF2B5EF4-FFF2-40B4-BE49-F238E27FC236}">
+                  <a16:creationId xmlns:a16="http://schemas.microsoft.com/office/drawing/2014/main" id="{962BE440-9634-4380-B142-5DB692420C52}"/>
+                </a:ext>
+              </a:extLst>
+            </p:cNvPr>
+            <p:cNvSpPr/>
+            <p:nvPr/>
+          </p:nvSpPr>
+          <p:spPr>
+            <a:xfrm rot="13500000">
+              <a:off x="10415015" y="2179851"/>
+              <a:ext cx="540000" cy="1080000"/>
+            </a:xfrm>
+            <a:prstGeom prst="ellipse">
+              <a:avLst/>
+            </a:prstGeom>
+            <a:gradFill>
+              <a:gsLst>
+                <a:gs pos="100000">
+                  <a:schemeClr val="accent1">
+                    <a:lumMod val="60000"/>
+                    <a:lumOff val="40000"/>
+                    <a:alpha val="0"/>
+                  </a:schemeClr>
+                </a:gs>
+                <a:gs pos="0">
+                  <a:schemeClr val="bg2">
+                    <a:lumMod val="75000"/>
+                    <a:lumOff val="25000"/>
+                    <a:alpha val="33000"/>
+                  </a:schemeClr>
+                </a:gs>
+              </a:gsLst>
+              <a:lin ang="5400000" scaled="0"/>
+            </a:gradFill>
+            <a:ln>
+              <a:noFill/>
+            </a:ln>
+            <a:effectLst>
+              <a:innerShdw blurRad="1270000" dist="2540000">
+                <a:schemeClr val="accent1">
+                  <a:lumMod val="60000"/>
+                  <a:lumOff val="40000"/>
+                  <a:alpha val="0"/>
+                </a:schemeClr>
+              </a:innerShdw>
+            </a:effectLst>
+          </p:spPr>
+          <p:style>
+            <a:lnRef idx="2">
+              <a:schemeClr val="accent1">
+                <a:shade val="50000"/>
+              </a:schemeClr>
+            </a:lnRef>
+            <a:fillRef idx="1">
+              <a:schemeClr val="accent1"/>
+            </a:fillRef>
+            <a:effectRef idx="0">
+              <a:schemeClr val="accent1"/>
+            </a:effectRef>
+            <a:fontRef idx="minor">
+              <a:schemeClr val="lt1"/>
+            </a:fontRef>
+          </p:style>
+          <p:txBody>
+            <a:bodyPr rot="0" spcFirstLastPara="0" vertOverflow="overflow" horzOverflow="overflow" vert="horz" wrap="square" lIns="91440" tIns="45720" rIns="91440" bIns="45720" numCol="1" spcCol="0" rtlCol="0" fromWordArt="0" anchor="ctr" anchorCtr="0" forceAA="0" compatLnSpc="1">
+              <a:prstTxWarp prst="textNoShape">
+                <a:avLst/>
+              </a:prstTxWarp>
+              <a:noAutofit/>
+            </a:bodyPr>
+            <a:lstStyle/>
+            <a:p>
+              <a:pPr algn="ctr"/>
+              <a:endParaRPr lang="en-US"/>
+            </a:p>
+          </p:txBody>
+        </p:sp>
+      </p:grpSp>
+      <p:sp>
+        <p:nvSpPr>
+          <p:cNvPr id="7" name="Title 6">
+            <a:extLst>
+              <a:ext uri="{FF2B5EF4-FFF2-40B4-BE49-F238E27FC236}">
+                <a16:creationId xmlns:a16="http://schemas.microsoft.com/office/drawing/2014/main" id="{4B18D636-CC10-4B1E-AA38-419DCCF2D9C9}"/>
               </a:ext>
             </a:extLst>
           </p:cNvPr>
@@ -18627,75 +19640,8 @@
         </p:nvSpPr>
         <p:spPr>
           <a:xfrm>
-            <a:off x="550863" y="4508500"/>
-            <a:ext cx="4500562" cy="1562959"/>
-          </a:xfrm>
-        </p:spPr>
-        <p:txBody>
-          <a:bodyPr/>
-          <a:lstStyle/>
-          <a:p>
-            <a:r>
-              <a:rPr lang="en-US" dirty="0"/>
-              <a:t>Resources</a:t>
-            </a:r>
-          </a:p>
-        </p:txBody>
-      </p:sp>
-      <p:pic>
-        <p:nvPicPr>
-          <p:cNvPr id="16" name="Picture Placeholder 15" descr="Data Points Digital background">
-            <a:extLst>
-              <a:ext uri="{FF2B5EF4-FFF2-40B4-BE49-F238E27FC236}">
-                <a16:creationId xmlns:a16="http://schemas.microsoft.com/office/drawing/2014/main" id="{361E9ADB-7377-4CF1-9AE4-AEFBDEBEEEEC}"/>
-              </a:ext>
-            </a:extLst>
-          </p:cNvPr>
-          <p:cNvPicPr>
-            <a:picLocks noGrp="1" noChangeAspect="1"/>
-          </p:cNvPicPr>
-          <p:nvPr>
-            <p:ph type="pic" sz="quarter" idx="13"/>
-          </p:nvPr>
-        </p:nvPicPr>
-        <p:blipFill rotWithShape="1">
-          <a:blip r:embed="rId3" cstate="screen">
-            <a:extLst>
-              <a:ext uri="{28A0092B-C50C-407E-A947-70E740481C1C}">
-                <a14:useLocalDpi xmlns:a14="http://schemas.microsoft.com/office/drawing/2010/main" val="0"/>
-              </a:ext>
-            </a:extLst>
-          </a:blip>
-          <a:srcRect/>
-          <a:stretch/>
-        </p:blipFill>
-        <p:spPr>
-          <a:xfrm>
-            <a:off x="0" y="0"/>
-            <a:ext cx="12192000" cy="3776472"/>
-          </a:xfrm>
-        </p:spPr>
-      </p:pic>
-      <p:sp>
-        <p:nvSpPr>
-          <p:cNvPr id="13" name="Content Placeholder 12">
-            <a:extLst>
-              <a:ext uri="{FF2B5EF4-FFF2-40B4-BE49-F238E27FC236}">
-                <a16:creationId xmlns:a16="http://schemas.microsoft.com/office/drawing/2014/main" id="{C0287FEC-3826-4868-8D93-52429C6156F5}"/>
-              </a:ext>
-            </a:extLst>
-          </p:cNvPr>
-          <p:cNvSpPr>
-            <a:spLocks noGrp="1"/>
-          </p:cNvSpPr>
-          <p:nvPr>
-            <p:ph sz="quarter" idx="15"/>
-          </p:nvPr>
-        </p:nvSpPr>
-        <p:spPr>
-          <a:xfrm>
-            <a:off x="3520036" y="4508500"/>
-            <a:ext cx="8129194" cy="1563688"/>
+            <a:off x="550862" y="549275"/>
+            <a:ext cx="11097551" cy="772675"/>
           </a:xfrm>
         </p:spPr>
         <p:txBody>
@@ -18705,14 +19651,246 @@
           <a:lstStyle/>
           <a:p>
             <a:r>
-              <a:rPr lang="en-US" sz="3200" dirty="0"/>
-              <a:t>https://github.com/joekunk/sql-server-security</a:t>
-            </a:r>
-          </a:p>
-          <a:p>
-            <a:r>
               <a:rPr lang="en-US" dirty="0"/>
-              <a:t>Public repo with the materials and scripts from this presentation</a:t>
+              <a:t>Recap</a:t>
+            </a:r>
+          </a:p>
+        </p:txBody>
+      </p:sp>
+      <p:sp>
+        <p:nvSpPr>
+          <p:cNvPr id="10" name="Content Placeholder 9">
+            <a:extLst>
+              <a:ext uri="{FF2B5EF4-FFF2-40B4-BE49-F238E27FC236}">
+                <a16:creationId xmlns:a16="http://schemas.microsoft.com/office/drawing/2014/main" id="{1DB251F7-EBE7-46AC-A920-FFE2C5AF68EA}"/>
+              </a:ext>
+            </a:extLst>
+          </p:cNvPr>
+          <p:cNvSpPr>
+            <a:spLocks noGrp="1"/>
+          </p:cNvSpPr>
+          <p:nvPr>
+            <p:ph sz="half" idx="2"/>
+          </p:nvPr>
+        </p:nvSpPr>
+        <p:spPr>
+          <a:xfrm>
+            <a:off x="550863" y="1630016"/>
+            <a:ext cx="11090274" cy="4312909"/>
+          </a:xfrm>
+        </p:spPr>
+        <p:txBody>
+          <a:bodyPr/>
+          <a:lstStyle/>
+          <a:p>
+            <a:pPr rtl="0" fontAlgn="ctr">
+              <a:spcBef>
+                <a:spcPts val="0"/>
+              </a:spcBef>
+              <a:spcAft>
+                <a:spcPts val="0"/>
+              </a:spcAft>
+              <a:buFont typeface="Arial" panose="020B0604020202020204" pitchFamily="34" charset="0"/>
+              <a:buChar char="•"/>
+            </a:pPr>
+            <a:r>
+              <a:rPr lang="en-US" dirty="0">
+                <a:effectLst/>
+                <a:latin typeface="Calibri" panose="020F0502020204030204" pitchFamily="34" charset="0"/>
+              </a:rPr>
+              <a:t>Never give more permissions </a:t>
+            </a:r>
+            <a:r>
+              <a:rPr lang="en-US" dirty="0">
+                <a:latin typeface="Calibri" panose="020F0502020204030204" pitchFamily="34" charset="0"/>
+              </a:rPr>
+              <a:t>than needed </a:t>
+            </a:r>
+            <a:r>
+              <a:rPr lang="en-US" dirty="0">
+                <a:effectLst/>
+                <a:latin typeface="Calibri" panose="020F0502020204030204" pitchFamily="34" charset="0"/>
+              </a:rPr>
+              <a:t>to accomplish the tasks</a:t>
+            </a:r>
+            <a:br>
+              <a:rPr lang="en-US" dirty="0">
+                <a:effectLst/>
+                <a:latin typeface="Calibri" panose="020F0502020204030204" pitchFamily="34" charset="0"/>
+              </a:rPr>
+            </a:br>
+            <a:endParaRPr lang="en-US" dirty="0">
+              <a:effectLst/>
+              <a:latin typeface="Calibri" panose="020F0502020204030204" pitchFamily="34" charset="0"/>
+            </a:endParaRPr>
+          </a:p>
+          <a:p>
+            <a:pPr rtl="0" fontAlgn="ctr">
+              <a:spcBef>
+                <a:spcPts val="0"/>
+              </a:spcBef>
+              <a:spcAft>
+                <a:spcPts val="0"/>
+              </a:spcAft>
+              <a:buFont typeface="Arial" panose="020B0604020202020204" pitchFamily="34" charset="0"/>
+              <a:buChar char="•"/>
+            </a:pPr>
+            <a:r>
+              <a:rPr lang="en-US" dirty="0">
+                <a:effectLst/>
+                <a:latin typeface="Calibri" panose="020F0502020204030204" pitchFamily="34" charset="0"/>
+              </a:rPr>
+              <a:t>Assign permissions to database roles and add/remove members in those roles</a:t>
+            </a:r>
+          </a:p>
+          <a:p>
+            <a:pPr rtl="0" fontAlgn="ctr">
+              <a:spcBef>
+                <a:spcPts val="0"/>
+              </a:spcBef>
+              <a:spcAft>
+                <a:spcPts val="0"/>
+              </a:spcAft>
+              <a:buFont typeface="Arial" panose="020B0604020202020204" pitchFamily="34" charset="0"/>
+              <a:buChar char="•"/>
+            </a:pPr>
+            <a:endParaRPr lang="en-US" dirty="0">
+              <a:effectLst/>
+              <a:latin typeface="Calibri" panose="020F0502020204030204" pitchFamily="34" charset="0"/>
+            </a:endParaRPr>
+          </a:p>
+          <a:p>
+            <a:pPr rtl="0" fontAlgn="ctr">
+              <a:spcBef>
+                <a:spcPts val="0"/>
+              </a:spcBef>
+              <a:spcAft>
+                <a:spcPts val="0"/>
+              </a:spcAft>
+              <a:buFont typeface="Arial" panose="020B0604020202020204" pitchFamily="34" charset="0"/>
+              <a:buChar char="•"/>
+            </a:pPr>
+            <a:r>
+              <a:rPr lang="en-US" dirty="0">
+                <a:latin typeface="Calibri" panose="020F0502020204030204" pitchFamily="34" charset="0"/>
+              </a:rPr>
+              <a:t>Restrict user objects to </a:t>
+            </a:r>
+            <a:r>
+              <a:rPr lang="en-US" dirty="0">
+                <a:effectLst/>
+                <a:latin typeface="Calibri" panose="020F0502020204030204" pitchFamily="34" charset="0"/>
+              </a:rPr>
+              <a:t>specific schemas </a:t>
+            </a:r>
+            <a:r>
+              <a:rPr lang="en-US" dirty="0">
+                <a:latin typeface="Calibri" panose="020F0502020204030204" pitchFamily="34" charset="0"/>
+              </a:rPr>
+              <a:t>with permissions provided </a:t>
+            </a:r>
+            <a:r>
+              <a:rPr lang="en-US" dirty="0">
+                <a:effectLst/>
+                <a:latin typeface="Calibri" panose="020F0502020204030204" pitchFamily="34" charset="0"/>
+              </a:rPr>
+              <a:t>by database roles</a:t>
+            </a:r>
+            <a:br>
+              <a:rPr lang="en-US" dirty="0">
+                <a:effectLst/>
+                <a:latin typeface="Calibri" panose="020F0502020204030204" pitchFamily="34" charset="0"/>
+              </a:rPr>
+            </a:br>
+            <a:endParaRPr lang="en-US" dirty="0">
+              <a:latin typeface="Calibri" panose="020F0502020204030204" pitchFamily="34" charset="0"/>
+            </a:endParaRPr>
+          </a:p>
+          <a:p>
+            <a:pPr rtl="0" fontAlgn="ctr">
+              <a:spcBef>
+                <a:spcPts val="0"/>
+              </a:spcBef>
+              <a:spcAft>
+                <a:spcPts val="0"/>
+              </a:spcAft>
+              <a:buFont typeface="Arial" panose="020B0604020202020204" pitchFamily="34" charset="0"/>
+              <a:buChar char="•"/>
+            </a:pPr>
+            <a:r>
+              <a:rPr lang="en-US" dirty="0">
+                <a:latin typeface="Calibri" panose="020F0502020204030204" pitchFamily="34" charset="0"/>
+              </a:rPr>
+              <a:t>Use No Login SQL users to execute stored procedures</a:t>
+            </a:r>
+            <a:r>
+              <a:rPr lang="en-US" dirty="0">
+                <a:effectLst/>
+                <a:latin typeface="Calibri" panose="020F0502020204030204" pitchFamily="34" charset="0"/>
+              </a:rPr>
+              <a:t> </a:t>
+            </a:r>
+          </a:p>
+          <a:p>
+            <a:pPr rtl="0" fontAlgn="ctr">
+              <a:spcBef>
+                <a:spcPts val="0"/>
+              </a:spcBef>
+              <a:spcAft>
+                <a:spcPts val="0"/>
+              </a:spcAft>
+              <a:buFont typeface="Arial" panose="020B0604020202020204" pitchFamily="34" charset="0"/>
+              <a:buChar char="•"/>
+            </a:pPr>
+            <a:endParaRPr lang="en-US" dirty="0">
+              <a:latin typeface="Calibri" panose="020F0502020204030204" pitchFamily="34" charset="0"/>
+            </a:endParaRPr>
+          </a:p>
+          <a:p>
+            <a:pPr rtl="0" fontAlgn="ctr">
+              <a:spcBef>
+                <a:spcPts val="0"/>
+              </a:spcBef>
+              <a:spcAft>
+                <a:spcPts val="0"/>
+              </a:spcAft>
+              <a:buFont typeface="Arial" panose="020B0604020202020204" pitchFamily="34" charset="0"/>
+              <a:buChar char="•"/>
+            </a:pPr>
+            <a:r>
+              <a:rPr lang="en-US" dirty="0">
+                <a:latin typeface="Calibri" panose="020F0502020204030204" pitchFamily="34" charset="0"/>
+              </a:rPr>
+              <a:t>When necessary, create SQL Users with complex passwords</a:t>
+            </a:r>
+            <a:br>
+              <a:rPr lang="en-US" dirty="0">
+                <a:effectLst/>
+                <a:latin typeface="Calibri" panose="020F0502020204030204" pitchFamily="34" charset="0"/>
+              </a:rPr>
+            </a:br>
+            <a:endParaRPr lang="en-US" dirty="0">
+              <a:effectLst/>
+              <a:latin typeface="Calibri" panose="020F0502020204030204" pitchFamily="34" charset="0"/>
+            </a:endParaRPr>
+          </a:p>
+          <a:p>
+            <a:pPr rtl="0" fontAlgn="ctr">
+              <a:spcBef>
+                <a:spcPts val="0"/>
+              </a:spcBef>
+              <a:spcAft>
+                <a:spcPts val="0"/>
+              </a:spcAft>
+              <a:buFont typeface="Arial" panose="020B0604020202020204" pitchFamily="34" charset="0"/>
+              <a:buChar char="•"/>
+            </a:pPr>
+            <a:r>
+              <a:rPr lang="en-US" dirty="0">
+                <a:effectLst/>
+                <a:latin typeface="Calibri" panose="020F0502020204030204" pitchFamily="34" charset="0"/>
+              </a:rPr>
+              <a:t>Audit user permissions on a regular basis using the script I showed or other tools</a:t>
             </a:r>
           </a:p>
         </p:txBody>
@@ -18818,10 +19996,171 @@
           </a:p>
         </p:txBody>
       </p:sp>
+      <p:sp>
+        <p:nvSpPr>
+          <p:cNvPr id="22" name="Freeform: Shape 21">
+            <a:extLst>
+              <a:ext uri="{FF2B5EF4-FFF2-40B4-BE49-F238E27FC236}">
+                <a16:creationId xmlns:a16="http://schemas.microsoft.com/office/drawing/2014/main" id="{C6F3814E-455F-456B-B1AF-7B993965A2C0}"/>
+              </a:ext>
+              <a:ext uri="{C183D7F6-B498-43B3-948B-1728B52AA6E4}">
+                <adec:decorative xmlns:adec="http://schemas.microsoft.com/office/drawing/2017/decorative" val="1"/>
+              </a:ext>
+            </a:extLst>
+          </p:cNvPr>
+          <p:cNvSpPr>
+            <a:spLocks noChangeAspect="1"/>
+          </p:cNvSpPr>
+          <p:nvPr/>
+        </p:nvSpPr>
+        <p:spPr>
+          <a:xfrm>
+            <a:off x="4295775" y="0"/>
+            <a:ext cx="360000" cy="274638"/>
+          </a:xfrm>
+          <a:custGeom>
+            <a:avLst/>
+            <a:gdLst>
+              <a:gd name="connsiteX0" fmla="*/ 30714 w 360000"/>
+              <a:gd name="connsiteY0" fmla="*/ 0 h 274638"/>
+              <a:gd name="connsiteX1" fmla="*/ 329286 w 360000"/>
+              <a:gd name="connsiteY1" fmla="*/ 0 h 274638"/>
+              <a:gd name="connsiteX2" fmla="*/ 345855 w 360000"/>
+              <a:gd name="connsiteY2" fmla="*/ 24574 h 274638"/>
+              <a:gd name="connsiteX3" fmla="*/ 360000 w 360000"/>
+              <a:gd name="connsiteY3" fmla="*/ 94638 h 274638"/>
+              <a:gd name="connsiteX4" fmla="*/ 180000 w 360000"/>
+              <a:gd name="connsiteY4" fmla="*/ 274638 h 274638"/>
+              <a:gd name="connsiteX5" fmla="*/ 0 w 360000"/>
+              <a:gd name="connsiteY5" fmla="*/ 94638 h 274638"/>
+              <a:gd name="connsiteX6" fmla="*/ 14145 w 360000"/>
+              <a:gd name="connsiteY6" fmla="*/ 24574 h 274638"/>
+            </a:gdLst>
+            <a:ahLst/>
+            <a:cxnLst>
+              <a:cxn ang="0">
+                <a:pos x="connsiteX0" y="connsiteY0"/>
+              </a:cxn>
+              <a:cxn ang="0">
+                <a:pos x="connsiteX1" y="connsiteY1"/>
+              </a:cxn>
+              <a:cxn ang="0">
+                <a:pos x="connsiteX2" y="connsiteY2"/>
+              </a:cxn>
+              <a:cxn ang="0">
+                <a:pos x="connsiteX3" y="connsiteY3"/>
+              </a:cxn>
+              <a:cxn ang="0">
+                <a:pos x="connsiteX4" y="connsiteY4"/>
+              </a:cxn>
+              <a:cxn ang="0">
+                <a:pos x="connsiteX5" y="connsiteY5"/>
+              </a:cxn>
+              <a:cxn ang="0">
+                <a:pos x="connsiteX6" y="connsiteY6"/>
+              </a:cxn>
+            </a:cxnLst>
+            <a:rect l="l" t="t" r="r" b="b"/>
+            <a:pathLst>
+              <a:path w="360000" h="274638">
+                <a:moveTo>
+                  <a:pt x="30714" y="0"/>
+                </a:moveTo>
+                <a:lnTo>
+                  <a:pt x="329286" y="0"/>
+                </a:lnTo>
+                <a:lnTo>
+                  <a:pt x="345855" y="24574"/>
+                </a:lnTo>
+                <a:cubicBezTo>
+                  <a:pt x="354963" y="46109"/>
+                  <a:pt x="360000" y="69785"/>
+                  <a:pt x="360000" y="94638"/>
+                </a:cubicBezTo>
+                <a:cubicBezTo>
+                  <a:pt x="360000" y="194049"/>
+                  <a:pt x="279411" y="274638"/>
+                  <a:pt x="180000" y="274638"/>
+                </a:cubicBezTo>
+                <a:cubicBezTo>
+                  <a:pt x="80589" y="274638"/>
+                  <a:pt x="0" y="194049"/>
+                  <a:pt x="0" y="94638"/>
+                </a:cubicBezTo>
+                <a:cubicBezTo>
+                  <a:pt x="0" y="69785"/>
+                  <a:pt x="5037" y="46109"/>
+                  <a:pt x="14145" y="24574"/>
+                </a:cubicBezTo>
+                <a:close/>
+              </a:path>
+            </a:pathLst>
+          </a:custGeom>
+          <a:gradFill flip="none" rotWithShape="1">
+            <a:gsLst>
+              <a:gs pos="100000">
+                <a:schemeClr val="bg2">
+                  <a:lumMod val="50000"/>
+                  <a:lumOff val="50000"/>
+                </a:schemeClr>
+              </a:gs>
+              <a:gs pos="60000">
+                <a:schemeClr val="bg2"/>
+              </a:gs>
+            </a:gsLst>
+            <a:path path="circle">
+              <a:fillToRect l="100000" b="100000"/>
+            </a:path>
+            <a:tileRect t="-100000" r="-100000"/>
+          </a:gradFill>
+          <a:ln>
+            <a:noFill/>
+          </a:ln>
+          <a:effectLst>
+            <a:innerShdw blurRad="127000" dist="63500" dir="2700000">
+              <a:schemeClr val="accent1">
+                <a:lumMod val="60000"/>
+                <a:lumOff val="40000"/>
+                <a:alpha val="20000"/>
+              </a:schemeClr>
+            </a:innerShdw>
+            <a:softEdge rad="0"/>
+          </a:effectLst>
+        </p:spPr>
+        <p:style>
+          <a:lnRef idx="2">
+            <a:schemeClr val="accent1">
+              <a:shade val="50000"/>
+            </a:schemeClr>
+          </a:lnRef>
+          <a:fillRef idx="1">
+            <a:schemeClr val="accent1"/>
+          </a:fillRef>
+          <a:effectRef idx="0">
+            <a:schemeClr val="accent1"/>
+          </a:effectRef>
+          <a:fontRef idx="minor">
+            <a:schemeClr val="lt1"/>
+          </a:fontRef>
+        </p:style>
+        <p:txBody>
+          <a:bodyPr rot="0" spcFirstLastPara="0" vertOverflow="overflow" horzOverflow="overflow" vert="horz" wrap="square" lIns="91440" tIns="45720" rIns="91440" bIns="45720" numCol="1" spcCol="0" rtlCol="0" fromWordArt="0" anchor="ctr" anchorCtr="0" forceAA="0" compatLnSpc="1">
+            <a:prstTxWarp prst="textNoShape">
+              <a:avLst/>
+            </a:prstTxWarp>
+            <a:noAutofit/>
+          </a:bodyPr>
+          <a:lstStyle/>
+          <a:p>
+            <a:pPr algn="ctr"/>
+            <a:endParaRPr lang="en-US"/>
+          </a:p>
+        </p:txBody>
+      </p:sp>
     </p:spTree>
     <p:extLst>
       <p:ext uri="{BB962C8B-B14F-4D97-AF65-F5344CB8AC3E}">
-        <p14:creationId xmlns:p14="http://schemas.microsoft.com/office/powerpoint/2010/main" val="3441738824"/>
+        <p14:creationId xmlns:p14="http://schemas.microsoft.com/office/powerpoint/2010/main" val="2112465238"/>
       </p:ext>
     </p:extLst>
   </p:cSld>
@@ -18850,10 +20189,10 @@
       </p:grpSpPr>
       <p:sp>
         <p:nvSpPr>
-          <p:cNvPr id="22" name="Title 21">
+          <p:cNvPr id="11" name="Title 10">
             <a:extLst>
               <a:ext uri="{FF2B5EF4-FFF2-40B4-BE49-F238E27FC236}">
-                <a16:creationId xmlns:a16="http://schemas.microsoft.com/office/drawing/2014/main" id="{F8FAEED9-1ECD-45F9-87A0-9394BAEABB79}"/>
+                <a16:creationId xmlns:a16="http://schemas.microsoft.com/office/drawing/2014/main" id="{581E8936-2270-47FE-94A4-398CB123EF90}"/>
               </a:ext>
             </a:extLst>
           </p:cNvPr>
@@ -18861,13 +20200,13 @@
             <a:spLocks noGrp="1"/>
           </p:cNvSpPr>
           <p:nvPr>
-            <p:ph type="ctrTitle"/>
+            <p:ph type="title"/>
           </p:nvPr>
         </p:nvSpPr>
         <p:spPr>
           <a:xfrm>
-            <a:off x="550863" y="549275"/>
-            <a:ext cx="5437187" cy="1400906"/>
+            <a:off x="389977" y="473395"/>
+            <a:ext cx="4500562" cy="1562959"/>
           </a:xfrm>
         </p:spPr>
         <p:txBody>
@@ -18876,17 +20215,17 @@
           <a:p>
             <a:r>
               <a:rPr lang="en-US" dirty="0"/>
-              <a:t>Thank You</a:t>
-            </a:r>
-          </a:p>
-        </p:txBody>
-      </p:sp>
-      <p:sp>
-        <p:nvSpPr>
-          <p:cNvPr id="23" name="Subtitle 22">
+              <a:t>Resources</a:t>
+            </a:r>
+          </a:p>
+        </p:txBody>
+      </p:sp>
+      <p:sp>
+        <p:nvSpPr>
+          <p:cNvPr id="13" name="Content Placeholder 12">
             <a:extLst>
               <a:ext uri="{FF2B5EF4-FFF2-40B4-BE49-F238E27FC236}">
-                <a16:creationId xmlns:a16="http://schemas.microsoft.com/office/drawing/2014/main" id="{8E5E4638-9BCB-4C2E-914F-CC868E2020D5}"/>
+                <a16:creationId xmlns:a16="http://schemas.microsoft.com/office/drawing/2014/main" id="{C0287FEC-3826-4868-8D93-52429C6156F5}"/>
               </a:ext>
             </a:extLst>
           </p:cNvPr>
@@ -18894,124 +20233,56 @@
             <a:spLocks noGrp="1"/>
           </p:cNvSpPr>
           <p:nvPr>
-            <p:ph type="subTitle" idx="1"/>
+            <p:ph sz="quarter" idx="15"/>
           </p:nvPr>
         </p:nvSpPr>
         <p:spPr>
           <a:xfrm>
-            <a:off x="550863" y="2419821"/>
-            <a:ext cx="5437187" cy="3179868"/>
+            <a:off x="389976" y="2332138"/>
+            <a:ext cx="11597891" cy="3842159"/>
           </a:xfrm>
         </p:spPr>
         <p:txBody>
-          <a:bodyPr/>
+          <a:bodyPr>
+            <a:normAutofit/>
+          </a:bodyPr>
           <a:lstStyle/>
           <a:p>
             <a:r>
-              <a:rPr lang="en-US" dirty="0"/>
-              <a:t>Joe Kunk</a:t>
-            </a:r>
-          </a:p>
-          <a:p>
-            <a:r>
-              <a:rPr lang="en-US" dirty="0"/>
-              <a:t>jkunk@dewpoint.com</a:t>
-            </a:r>
-          </a:p>
-          <a:p>
-            <a:r>
-              <a:rPr lang="en-US" dirty="0"/>
-              <a:t>517-939-9970 mobile</a:t>
-            </a:r>
-          </a:p>
-          <a:p>
-            <a:r>
-              <a:rPr lang="en-US" dirty="0"/>
-              <a:t>LinkedIn:  joe-kunk-b926091</a:t>
-            </a:r>
-          </a:p>
-          <a:p>
-            <a:r>
-              <a:rPr lang="en-US" dirty="0"/>
-              <a:t>Mastodon: @joekunk@techhub.social</a:t>
-            </a:r>
-          </a:p>
-        </p:txBody>
-      </p:sp>
-      <p:pic>
-        <p:nvPicPr>
-          <p:cNvPr id="27" name="Picture Placeholder 26" descr="Data Points Digital background">
+              <a:rPr lang="en-US" sz="2800" dirty="0"/>
+              <a:t>SQL Server Developer Edition - Free Enterprise Level Single User Version</a:t>
+            </a:r>
+          </a:p>
+          <a:p>
+            <a:r>
+              <a:rPr lang="en-US" sz="2800" dirty="0"/>
+              <a:t>    https://www.microsoft.com/en-us/sql-server/sql-server-downloads</a:t>
+            </a:r>
+          </a:p>
+          <a:p>
+            <a:endParaRPr lang="en-US" sz="2800" dirty="0"/>
+          </a:p>
+          <a:p>
+            <a:r>
+              <a:rPr lang="en-US" sz="2800" dirty="0"/>
+              <a:t>AdventureWorks2012 Sample Database - used in demos</a:t>
+            </a:r>
+          </a:p>
+          <a:p>
+            <a:r>
+              <a:rPr lang="en-US" sz="2800" dirty="0"/>
+              <a:t> https://learn.microsoft.com/en-us/sql/samples/adventureworks-install-configure?view=sql-server-ver16&amp;tabs=ssms</a:t>
+            </a:r>
+            <a:endParaRPr lang="en-US" sz="1800" dirty="0"/>
+          </a:p>
+        </p:txBody>
+      </p:sp>
+      <p:sp>
+        <p:nvSpPr>
+          <p:cNvPr id="4" name="Date Placeholder 3">
             <a:extLst>
               <a:ext uri="{FF2B5EF4-FFF2-40B4-BE49-F238E27FC236}">
-                <a16:creationId xmlns:a16="http://schemas.microsoft.com/office/drawing/2014/main" id="{9E660784-34E2-4CDA-926A-DDD6AAF35046}"/>
-              </a:ext>
-            </a:extLst>
-          </p:cNvPr>
-          <p:cNvPicPr>
-            <a:picLocks noGrp="1" noChangeAspect="1"/>
-          </p:cNvPicPr>
-          <p:nvPr>
-            <p:ph type="pic" sz="quarter" idx="15"/>
-          </p:nvPr>
-        </p:nvPicPr>
-        <p:blipFill rotWithShape="1">
-          <a:blip r:embed="rId2" cstate="screen">
-            <a:extLst>
-              <a:ext uri="{28A0092B-C50C-407E-A947-70E740481C1C}">
-                <a14:useLocalDpi xmlns:a14="http://schemas.microsoft.com/office/drawing/2010/main" val="0"/>
-              </a:ext>
-            </a:extLst>
-          </a:blip>
-          <a:srcRect/>
-          <a:stretch/>
-        </p:blipFill>
-        <p:spPr>
-          <a:xfrm>
-            <a:off x="6556248" y="548640"/>
-            <a:ext cx="5084064" cy="2880360"/>
-          </a:xfrm>
-        </p:spPr>
-      </p:pic>
-      <p:pic>
-        <p:nvPicPr>
-          <p:cNvPr id="33" name="Picture Placeholder 32" descr="Data Points Digital background">
-            <a:extLst>
-              <a:ext uri="{FF2B5EF4-FFF2-40B4-BE49-F238E27FC236}">
-                <a16:creationId xmlns:a16="http://schemas.microsoft.com/office/drawing/2014/main" id="{48106962-23C6-4DFE-BB3A-E5FFF03F38CE}"/>
-              </a:ext>
-            </a:extLst>
-          </p:cNvPr>
-          <p:cNvPicPr>
-            <a:picLocks noGrp="1" noChangeAspect="1"/>
-          </p:cNvPicPr>
-          <p:nvPr>
-            <p:ph type="pic" sz="quarter" idx="16"/>
-          </p:nvPr>
-        </p:nvPicPr>
-        <p:blipFill rotWithShape="1">
-          <a:blip r:embed="rId3" cstate="screen">
-            <a:extLst>
-              <a:ext uri="{28A0092B-C50C-407E-A947-70E740481C1C}">
-                <a14:useLocalDpi xmlns:a14="http://schemas.microsoft.com/office/drawing/2010/main" val="0"/>
-              </a:ext>
-            </a:extLst>
-          </a:blip>
-          <a:srcRect/>
-          <a:stretch/>
-        </p:blipFill>
-        <p:spPr>
-          <a:xfrm>
-            <a:off x="6556248" y="3429000"/>
-            <a:ext cx="5084064" cy="2880360"/>
-          </a:xfrm>
-        </p:spPr>
-      </p:pic>
-      <p:sp>
-        <p:nvSpPr>
-          <p:cNvPr id="4" name="Date Placeholder 3">
-            <a:extLst>
-              <a:ext uri="{FF2B5EF4-FFF2-40B4-BE49-F238E27FC236}">
-                <a16:creationId xmlns:a16="http://schemas.microsoft.com/office/drawing/2014/main" id="{7823E305-6365-4345-8BD1-4A31C61D96CB}"/>
+                <a16:creationId xmlns:a16="http://schemas.microsoft.com/office/drawing/2014/main" id="{0C329F70-04F7-4C70-BCF8-D4371F54EF2F}"/>
               </a:ext>
             </a:extLst>
           </p:cNvPr>
@@ -19044,7 +20315,7 @@
           <p:cNvPr id="5" name="Footer Placeholder 4">
             <a:extLst>
               <a:ext uri="{FF2B5EF4-FFF2-40B4-BE49-F238E27FC236}">
-                <a16:creationId xmlns:a16="http://schemas.microsoft.com/office/drawing/2014/main" id="{0B37A3FF-ED32-4C4A-A21F-848A3BF6F896}"/>
+                <a16:creationId xmlns:a16="http://schemas.microsoft.com/office/drawing/2014/main" id="{06A3302E-502D-4151-81C9-5FD6AF9596D6}"/>
               </a:ext>
             </a:extLst>
           </p:cNvPr>
@@ -19077,7 +20348,7 @@
           <p:cNvPr id="6" name="Slide Number Placeholder 5">
             <a:extLst>
               <a:ext uri="{FF2B5EF4-FFF2-40B4-BE49-F238E27FC236}">
-                <a16:creationId xmlns:a16="http://schemas.microsoft.com/office/drawing/2014/main" id="{36E60F23-FB58-4EF8-82FD-E86CED25FDD4}"/>
+                <a16:creationId xmlns:a16="http://schemas.microsoft.com/office/drawing/2014/main" id="{9ED907F8-C614-4D59-A03F-BF9CD5E35703}"/>
               </a:ext>
             </a:extLst>
           </p:cNvPr>
@@ -19110,7 +20381,7 @@
     </p:spTree>
     <p:extLst>
       <p:ext uri="{BB962C8B-B14F-4D97-AF65-F5344CB8AC3E}">
-        <p14:creationId xmlns:p14="http://schemas.microsoft.com/office/powerpoint/2010/main" val="285719596"/>
+        <p14:creationId xmlns:p14="http://schemas.microsoft.com/office/powerpoint/2010/main" val="3441738824"/>
       </p:ext>
     </p:extLst>
   </p:cSld>

</xml_diff>